<commit_message>
Burkholderia pseudomallei was added to the figure
</commit_message>
<xml_diff>
--- a/images/rnafold_Proteobacteria.pptx
+++ b/images/rnafold_Proteobacteria.pptx
@@ -7,7 +7,7 @@
   <p:sldIdLst>
     <p:sldId id="256" r:id="rId2"/>
   </p:sldIdLst>
-  <p:sldSz cx="13716000" cy="8229600"/>
+  <p:sldSz cx="15544800" cy="8229600"/>
   <p:notesSz cx="6858000" cy="9144000"/>
   <p:defaultTextStyle>
     <a:defPPr>
@@ -112,7 +112,7 @@
             <a:srgbClr val="A4A3A4"/>
           </p15:clr>
         </p15:guide>
-        <p15:guide id="2" pos="4320" userDrawn="1">
+        <p15:guide id="2" pos="4896" userDrawn="1">
           <p15:clr>
             <a:srgbClr val="A4A3A4"/>
           </p15:clr>
@@ -152,8 +152,8 @@
         </p:nvSpPr>
         <p:spPr>
           <a:xfrm>
-            <a:off x="1028711" y="2556525"/>
-            <a:ext cx="11658598" cy="1764029"/>
+            <a:off x="1165872" y="2556526"/>
+            <a:ext cx="13213078" cy="1764029"/>
           </a:xfrm>
         </p:spPr>
         <p:txBody>
@@ -180,8 +180,8 @@
         </p:nvSpPr>
         <p:spPr>
           <a:xfrm>
-            <a:off x="2057411" y="4663448"/>
-            <a:ext cx="9601202" cy="2103118"/>
+            <a:off x="2331733" y="4663448"/>
+            <a:ext cx="10881362" cy="2103118"/>
           </a:xfrm>
         </p:spPr>
         <p:txBody>
@@ -197,7 +197,7 @@
                 </a:solidFill>
               </a:defRPr>
             </a:lvl1pPr>
-            <a:lvl2pPr marL="1645445" indent="0" algn="ctr">
+            <a:lvl2pPr marL="1864783" indent="0" algn="ctr">
               <a:buNone/>
               <a:defRPr>
                 <a:solidFill>
@@ -207,7 +207,7 @@
                 </a:solidFill>
               </a:defRPr>
             </a:lvl2pPr>
-            <a:lvl3pPr marL="3290906" indent="0" algn="ctr">
+            <a:lvl3pPr marL="3729584" indent="0" algn="ctr">
               <a:buNone/>
               <a:defRPr>
                 <a:solidFill>
@@ -217,7 +217,7 @@
                 </a:solidFill>
               </a:defRPr>
             </a:lvl3pPr>
-            <a:lvl4pPr marL="4936352" indent="0" algn="ctr">
+            <a:lvl4pPr marL="5594368" indent="0" algn="ctr">
               <a:buNone/>
               <a:defRPr>
                 <a:solidFill>
@@ -227,7 +227,7 @@
                 </a:solidFill>
               </a:defRPr>
             </a:lvl4pPr>
-            <a:lvl5pPr marL="6581797" indent="0" algn="ctr">
+            <a:lvl5pPr marL="7459151" indent="0" algn="ctr">
               <a:buNone/>
               <a:defRPr>
                 <a:solidFill>
@@ -237,7 +237,7 @@
                 </a:solidFill>
               </a:defRPr>
             </a:lvl5pPr>
-            <a:lvl6pPr marL="8227261" indent="0" algn="ctr">
+            <a:lvl6pPr marL="9323955" indent="0" algn="ctr">
               <a:buNone/>
               <a:defRPr>
                 <a:solidFill>
@@ -247,7 +247,7 @@
                 </a:solidFill>
               </a:defRPr>
             </a:lvl6pPr>
-            <a:lvl7pPr marL="9872706" indent="0" algn="ctr">
+            <a:lvl7pPr marL="11188738" indent="0" algn="ctr">
               <a:buNone/>
               <a:defRPr>
                 <a:solidFill>
@@ -257,7 +257,7 @@
                 </a:solidFill>
               </a:defRPr>
             </a:lvl7pPr>
-            <a:lvl8pPr marL="11518169" indent="0" algn="ctr">
+            <a:lvl8pPr marL="13053541" indent="0" algn="ctr">
               <a:buNone/>
               <a:defRPr>
                 <a:solidFill>
@@ -267,7 +267,7 @@
                 </a:solidFill>
               </a:defRPr>
             </a:lvl8pPr>
-            <a:lvl9pPr marL="13163627" indent="0" algn="ctr">
+            <a:lvl9pPr marL="14918338" indent="0" algn="ctr">
               <a:buNone/>
               <a:defRPr>
                 <a:solidFill>
@@ -304,7 +304,7 @@
           <a:p>
             <a:fld id="{01197F44-DB72-474A-9754-31703E05C006}" type="datetimeFigureOut">
               <a:rPr lang="en-US" smtClean="0"/>
-              <a:t>10/1/19</a:t>
+              <a:t>10/17/19</a:t>
             </a:fld>
             <a:endParaRPr lang="en-US"/>
           </a:p>
@@ -474,7 +474,7 @@
           <a:p>
             <a:fld id="{01197F44-DB72-474A-9754-31703E05C006}" type="datetimeFigureOut">
               <a:rPr lang="en-US" smtClean="0"/>
-              <a:t>10/1/19</a:t>
+              <a:t>10/17/19</a:t>
             </a:fld>
             <a:endParaRPr lang="en-US"/>
           </a:p>
@@ -564,8 +564,8 @@
         </p:nvSpPr>
         <p:spPr>
           <a:xfrm>
-            <a:off x="9944103" y="329574"/>
-            <a:ext cx="3086100" cy="7021834"/>
+            <a:off x="11269983" y="329574"/>
+            <a:ext cx="3497580" cy="7021834"/>
           </a:xfrm>
         </p:spPr>
         <p:txBody>
@@ -592,8 +592,8 @@
         </p:nvSpPr>
         <p:spPr>
           <a:xfrm>
-            <a:off x="685810" y="329574"/>
-            <a:ext cx="9029700" cy="7021834"/>
+            <a:off x="777251" y="329574"/>
+            <a:ext cx="10233660" cy="7021834"/>
           </a:xfrm>
         </p:spPr>
         <p:txBody>
@@ -654,7 +654,7 @@
           <a:p>
             <a:fld id="{01197F44-DB72-474A-9754-31703E05C006}" type="datetimeFigureOut">
               <a:rPr lang="en-US" smtClean="0"/>
-              <a:t>10/1/19</a:t>
+              <a:t>10/17/19</a:t>
             </a:fld>
             <a:endParaRPr lang="en-US"/>
           </a:p>
@@ -824,7 +824,7 @@
           <a:p>
             <a:fld id="{01197F44-DB72-474A-9754-31703E05C006}" type="datetimeFigureOut">
               <a:rPr lang="en-US" smtClean="0"/>
-              <a:t>10/1/19</a:t>
+              <a:t>10/17/19</a:t>
             </a:fld>
             <a:endParaRPr lang="en-US"/>
           </a:p>
@@ -914,15 +914,15 @@
         </p:nvSpPr>
         <p:spPr>
           <a:xfrm>
-            <a:off x="1083479" y="5288293"/>
-            <a:ext cx="11658598" cy="1634495"/>
+            <a:off x="1227943" y="5288294"/>
+            <a:ext cx="13213078" cy="1634495"/>
           </a:xfrm>
         </p:spPr>
         <p:txBody>
           <a:bodyPr anchor="t"/>
           <a:lstStyle>
             <a:lvl1pPr algn="l">
-              <a:defRPr sz="14580" b="1" cap="all"/>
+              <a:defRPr sz="16524" b="1" cap="all"/>
             </a:lvl1pPr>
           </a:lstStyle>
           <a:p>
@@ -946,8 +946,8 @@
         </p:nvSpPr>
         <p:spPr>
           <a:xfrm>
-            <a:off x="1083479" y="3488066"/>
-            <a:ext cx="11658598" cy="1800225"/>
+            <a:off x="1227943" y="3488067"/>
+            <a:ext cx="13213078" cy="1800225"/>
           </a:xfrm>
         </p:spPr>
         <p:txBody>
@@ -955,7 +955,7 @@
           <a:lstStyle>
             <a:lvl1pPr marL="0" indent="0">
               <a:buNone/>
-              <a:defRPr sz="7780">
+              <a:defRPr sz="8817">
                 <a:solidFill>
                   <a:schemeClr val="tx1">
                     <a:tint val="75000"/>
@@ -963,9 +963,9 @@
                 </a:solidFill>
               </a:defRPr>
             </a:lvl1pPr>
-            <a:lvl2pPr marL="1645445" indent="0">
-              <a:buNone/>
-              <a:defRPr sz="6805">
+            <a:lvl2pPr marL="1864783" indent="0">
+              <a:buNone/>
+              <a:defRPr sz="7712">
                 <a:solidFill>
                   <a:schemeClr val="tx1">
                     <a:tint val="75000"/>
@@ -973,9 +973,9 @@
                 </a:solidFill>
               </a:defRPr>
             </a:lvl2pPr>
-            <a:lvl3pPr marL="3290906" indent="0">
-              <a:buNone/>
-              <a:defRPr sz="5832">
+            <a:lvl3pPr marL="3729584" indent="0">
+              <a:buNone/>
+              <a:defRPr sz="6609">
                 <a:solidFill>
                   <a:schemeClr val="tx1">
                     <a:tint val="75000"/>
@@ -983,9 +983,9 @@
                 </a:solidFill>
               </a:defRPr>
             </a:lvl3pPr>
-            <a:lvl4pPr marL="4936352" indent="0">
-              <a:buNone/>
-              <a:defRPr sz="4860">
+            <a:lvl4pPr marL="5594368" indent="0">
+              <a:buNone/>
+              <a:defRPr sz="5508">
                 <a:solidFill>
                   <a:schemeClr val="tx1">
                     <a:tint val="75000"/>
@@ -993,9 +993,9 @@
                 </a:solidFill>
               </a:defRPr>
             </a:lvl4pPr>
-            <a:lvl5pPr marL="6581797" indent="0">
-              <a:buNone/>
-              <a:defRPr sz="4860">
+            <a:lvl5pPr marL="7459151" indent="0">
+              <a:buNone/>
+              <a:defRPr sz="5508">
                 <a:solidFill>
                   <a:schemeClr val="tx1">
                     <a:tint val="75000"/>
@@ -1003,9 +1003,9 @@
                 </a:solidFill>
               </a:defRPr>
             </a:lvl5pPr>
-            <a:lvl6pPr marL="8227261" indent="0">
-              <a:buNone/>
-              <a:defRPr sz="4860">
+            <a:lvl6pPr marL="9323955" indent="0">
+              <a:buNone/>
+              <a:defRPr sz="5508">
                 <a:solidFill>
                   <a:schemeClr val="tx1">
                     <a:tint val="75000"/>
@@ -1013,9 +1013,9 @@
                 </a:solidFill>
               </a:defRPr>
             </a:lvl6pPr>
-            <a:lvl7pPr marL="9872706" indent="0">
-              <a:buNone/>
-              <a:defRPr sz="4860">
+            <a:lvl7pPr marL="11188738" indent="0">
+              <a:buNone/>
+              <a:defRPr sz="5508">
                 <a:solidFill>
                   <a:schemeClr val="tx1">
                     <a:tint val="75000"/>
@@ -1023,9 +1023,9 @@
                 </a:solidFill>
               </a:defRPr>
             </a:lvl7pPr>
-            <a:lvl8pPr marL="11518169" indent="0">
-              <a:buNone/>
-              <a:defRPr sz="4860">
+            <a:lvl8pPr marL="13053541" indent="0">
+              <a:buNone/>
+              <a:defRPr sz="5508">
                 <a:solidFill>
                   <a:schemeClr val="tx1">
                     <a:tint val="75000"/>
@@ -1033,9 +1033,9 @@
                 </a:solidFill>
               </a:defRPr>
             </a:lvl8pPr>
-            <a:lvl9pPr marL="13163627" indent="0">
-              <a:buNone/>
-              <a:defRPr sz="4860">
+            <a:lvl9pPr marL="14918338" indent="0">
+              <a:buNone/>
+              <a:defRPr sz="5508">
                 <a:solidFill>
                   <a:schemeClr val="tx1">
                     <a:tint val="75000"/>
@@ -1070,7 +1070,7 @@
           <a:p>
             <a:fld id="{01197F44-DB72-474A-9754-31703E05C006}" type="datetimeFigureOut">
               <a:rPr lang="en-US" smtClean="0"/>
-              <a:t>10/1/19</a:t>
+              <a:t>10/17/19</a:t>
             </a:fld>
             <a:endParaRPr lang="en-US"/>
           </a:p>
@@ -1183,39 +1183,39 @@
         </p:nvSpPr>
         <p:spPr>
           <a:xfrm>
-            <a:off x="685809" y="1920257"/>
-            <a:ext cx="6057902" cy="5431156"/>
+            <a:off x="777250" y="1920257"/>
+            <a:ext cx="6865622" cy="5431156"/>
           </a:xfrm>
         </p:spPr>
         <p:txBody>
           <a:bodyPr/>
           <a:lstStyle>
             <a:lvl1pPr>
-              <a:defRPr sz="10692"/>
+              <a:defRPr sz="12117"/>
             </a:lvl1pPr>
             <a:lvl2pPr>
-              <a:defRPr sz="8749"/>
+              <a:defRPr sz="9915"/>
             </a:lvl2pPr>
             <a:lvl3pPr>
-              <a:defRPr sz="7780"/>
+              <a:defRPr sz="8817"/>
             </a:lvl3pPr>
             <a:lvl4pPr>
-              <a:defRPr sz="6805"/>
+              <a:defRPr sz="7712"/>
             </a:lvl4pPr>
             <a:lvl5pPr>
-              <a:defRPr sz="6805"/>
+              <a:defRPr sz="7712"/>
             </a:lvl5pPr>
             <a:lvl6pPr>
-              <a:defRPr sz="6805"/>
+              <a:defRPr sz="7712"/>
             </a:lvl6pPr>
             <a:lvl7pPr>
-              <a:defRPr sz="6805"/>
+              <a:defRPr sz="7712"/>
             </a:lvl7pPr>
             <a:lvl8pPr>
-              <a:defRPr sz="6805"/>
+              <a:defRPr sz="7712"/>
             </a:lvl8pPr>
             <a:lvl9pPr>
-              <a:defRPr sz="6805"/>
+              <a:defRPr sz="7712"/>
             </a:lvl9pPr>
           </a:lstStyle>
           <a:p>
@@ -1268,39 +1268,39 @@
         </p:nvSpPr>
         <p:spPr>
           <a:xfrm>
-            <a:off x="6972311" y="1920257"/>
-            <a:ext cx="6057902" cy="5431156"/>
+            <a:off x="7901953" y="1920257"/>
+            <a:ext cx="6865622" cy="5431156"/>
           </a:xfrm>
         </p:spPr>
         <p:txBody>
           <a:bodyPr/>
           <a:lstStyle>
             <a:lvl1pPr>
-              <a:defRPr sz="10692"/>
+              <a:defRPr sz="12117"/>
             </a:lvl1pPr>
             <a:lvl2pPr>
-              <a:defRPr sz="8749"/>
+              <a:defRPr sz="9915"/>
             </a:lvl2pPr>
             <a:lvl3pPr>
-              <a:defRPr sz="7780"/>
+              <a:defRPr sz="8817"/>
             </a:lvl3pPr>
             <a:lvl4pPr>
-              <a:defRPr sz="6805"/>
+              <a:defRPr sz="7712"/>
             </a:lvl4pPr>
             <a:lvl5pPr>
-              <a:defRPr sz="6805"/>
+              <a:defRPr sz="7712"/>
             </a:lvl5pPr>
             <a:lvl6pPr>
-              <a:defRPr sz="6805"/>
+              <a:defRPr sz="7712"/>
             </a:lvl6pPr>
             <a:lvl7pPr>
-              <a:defRPr sz="6805"/>
+              <a:defRPr sz="7712"/>
             </a:lvl7pPr>
             <a:lvl8pPr>
-              <a:defRPr sz="6805"/>
+              <a:defRPr sz="7712"/>
             </a:lvl8pPr>
             <a:lvl9pPr>
-              <a:defRPr sz="6805"/>
+              <a:defRPr sz="7712"/>
             </a:lvl9pPr>
           </a:lstStyle>
           <a:p>
@@ -1358,7 +1358,7 @@
           <a:p>
             <a:fld id="{01197F44-DB72-474A-9754-31703E05C006}" type="datetimeFigureOut">
               <a:rPr lang="en-US" smtClean="0"/>
-              <a:t>10/1/19</a:t>
+              <a:t>10/17/19</a:t>
             </a:fld>
             <a:endParaRPr lang="en-US"/>
           </a:p>
@@ -1475,8 +1475,8 @@
         </p:nvSpPr>
         <p:spPr>
           <a:xfrm>
-            <a:off x="685818" y="1842146"/>
-            <a:ext cx="6060283" cy="767711"/>
+            <a:off x="777261" y="1842147"/>
+            <a:ext cx="6868321" cy="767711"/>
           </a:xfrm>
         </p:spPr>
         <p:txBody>
@@ -1484,39 +1484,39 @@
           <a:lstStyle>
             <a:lvl1pPr marL="0" indent="0">
               <a:buNone/>
-              <a:defRPr sz="8749" b="1"/>
+              <a:defRPr sz="9915" b="1"/>
             </a:lvl1pPr>
-            <a:lvl2pPr marL="1645445" indent="0">
-              <a:buNone/>
-              <a:defRPr sz="7780" b="1"/>
+            <a:lvl2pPr marL="1864783" indent="0">
+              <a:buNone/>
+              <a:defRPr sz="8817" b="1"/>
             </a:lvl2pPr>
-            <a:lvl3pPr marL="3290906" indent="0">
-              <a:buNone/>
-              <a:defRPr sz="6805" b="1"/>
+            <a:lvl3pPr marL="3729584" indent="0">
+              <a:buNone/>
+              <a:defRPr sz="7712" b="1"/>
             </a:lvl3pPr>
-            <a:lvl4pPr marL="4936352" indent="0">
-              <a:buNone/>
-              <a:defRPr sz="5832" b="1"/>
+            <a:lvl4pPr marL="5594368" indent="0">
+              <a:buNone/>
+              <a:defRPr sz="6609" b="1"/>
             </a:lvl4pPr>
-            <a:lvl5pPr marL="6581797" indent="0">
-              <a:buNone/>
-              <a:defRPr sz="5832" b="1"/>
+            <a:lvl5pPr marL="7459151" indent="0">
+              <a:buNone/>
+              <a:defRPr sz="6609" b="1"/>
             </a:lvl5pPr>
-            <a:lvl6pPr marL="8227261" indent="0">
-              <a:buNone/>
-              <a:defRPr sz="5832" b="1"/>
+            <a:lvl6pPr marL="9323955" indent="0">
+              <a:buNone/>
+              <a:defRPr sz="6609" b="1"/>
             </a:lvl6pPr>
-            <a:lvl7pPr marL="9872706" indent="0">
-              <a:buNone/>
-              <a:defRPr sz="5832" b="1"/>
+            <a:lvl7pPr marL="11188738" indent="0">
+              <a:buNone/>
+              <a:defRPr sz="6609" b="1"/>
             </a:lvl7pPr>
-            <a:lvl8pPr marL="11518169" indent="0">
-              <a:buNone/>
-              <a:defRPr sz="5832" b="1"/>
+            <a:lvl8pPr marL="13053541" indent="0">
+              <a:buNone/>
+              <a:defRPr sz="6609" b="1"/>
             </a:lvl8pPr>
-            <a:lvl9pPr marL="13163627" indent="0">
-              <a:buNone/>
-              <a:defRPr sz="5832" b="1"/>
+            <a:lvl9pPr marL="14918338" indent="0">
+              <a:buNone/>
+              <a:defRPr sz="6609" b="1"/>
             </a:lvl9pPr>
           </a:lstStyle>
           <a:p>
@@ -1540,39 +1540,39 @@
         </p:nvSpPr>
         <p:spPr>
           <a:xfrm>
-            <a:off x="685818" y="2609851"/>
-            <a:ext cx="6060283" cy="4741549"/>
+            <a:off x="777261" y="2609852"/>
+            <a:ext cx="6868321" cy="4741549"/>
           </a:xfrm>
         </p:spPr>
         <p:txBody>
           <a:bodyPr/>
           <a:lstStyle>
             <a:lvl1pPr>
-              <a:defRPr sz="8749"/>
+              <a:defRPr sz="9915"/>
             </a:lvl1pPr>
             <a:lvl2pPr>
-              <a:defRPr sz="7780"/>
+              <a:defRPr sz="8817"/>
             </a:lvl2pPr>
             <a:lvl3pPr>
-              <a:defRPr sz="6805"/>
+              <a:defRPr sz="7712"/>
             </a:lvl3pPr>
             <a:lvl4pPr>
-              <a:defRPr sz="5832"/>
+              <a:defRPr sz="6609"/>
             </a:lvl4pPr>
             <a:lvl5pPr>
-              <a:defRPr sz="5832"/>
+              <a:defRPr sz="6609"/>
             </a:lvl5pPr>
             <a:lvl6pPr>
-              <a:defRPr sz="5832"/>
+              <a:defRPr sz="6609"/>
             </a:lvl6pPr>
             <a:lvl7pPr>
-              <a:defRPr sz="5832"/>
+              <a:defRPr sz="6609"/>
             </a:lvl7pPr>
             <a:lvl8pPr>
-              <a:defRPr sz="5832"/>
+              <a:defRPr sz="6609"/>
             </a:lvl8pPr>
             <a:lvl9pPr>
-              <a:defRPr sz="5832"/>
+              <a:defRPr sz="6609"/>
             </a:lvl9pPr>
           </a:lstStyle>
           <a:p>
@@ -1625,8 +1625,8 @@
         </p:nvSpPr>
         <p:spPr>
           <a:xfrm>
-            <a:off x="6967544" y="1842146"/>
-            <a:ext cx="6062665" cy="767711"/>
+            <a:off x="7896551" y="1842147"/>
+            <a:ext cx="6871020" cy="767711"/>
           </a:xfrm>
         </p:spPr>
         <p:txBody>
@@ -1634,39 +1634,39 @@
           <a:lstStyle>
             <a:lvl1pPr marL="0" indent="0">
               <a:buNone/>
-              <a:defRPr sz="8749" b="1"/>
+              <a:defRPr sz="9915" b="1"/>
             </a:lvl1pPr>
-            <a:lvl2pPr marL="1645445" indent="0">
-              <a:buNone/>
-              <a:defRPr sz="7780" b="1"/>
+            <a:lvl2pPr marL="1864783" indent="0">
+              <a:buNone/>
+              <a:defRPr sz="8817" b="1"/>
             </a:lvl2pPr>
-            <a:lvl3pPr marL="3290906" indent="0">
-              <a:buNone/>
-              <a:defRPr sz="6805" b="1"/>
+            <a:lvl3pPr marL="3729584" indent="0">
+              <a:buNone/>
+              <a:defRPr sz="7712" b="1"/>
             </a:lvl3pPr>
-            <a:lvl4pPr marL="4936352" indent="0">
-              <a:buNone/>
-              <a:defRPr sz="5832" b="1"/>
+            <a:lvl4pPr marL="5594368" indent="0">
+              <a:buNone/>
+              <a:defRPr sz="6609" b="1"/>
             </a:lvl4pPr>
-            <a:lvl5pPr marL="6581797" indent="0">
-              <a:buNone/>
-              <a:defRPr sz="5832" b="1"/>
+            <a:lvl5pPr marL="7459151" indent="0">
+              <a:buNone/>
+              <a:defRPr sz="6609" b="1"/>
             </a:lvl5pPr>
-            <a:lvl6pPr marL="8227261" indent="0">
-              <a:buNone/>
-              <a:defRPr sz="5832" b="1"/>
+            <a:lvl6pPr marL="9323955" indent="0">
+              <a:buNone/>
+              <a:defRPr sz="6609" b="1"/>
             </a:lvl6pPr>
-            <a:lvl7pPr marL="9872706" indent="0">
-              <a:buNone/>
-              <a:defRPr sz="5832" b="1"/>
+            <a:lvl7pPr marL="11188738" indent="0">
+              <a:buNone/>
+              <a:defRPr sz="6609" b="1"/>
             </a:lvl7pPr>
-            <a:lvl8pPr marL="11518169" indent="0">
-              <a:buNone/>
-              <a:defRPr sz="5832" b="1"/>
+            <a:lvl8pPr marL="13053541" indent="0">
+              <a:buNone/>
+              <a:defRPr sz="6609" b="1"/>
             </a:lvl8pPr>
-            <a:lvl9pPr marL="13163627" indent="0">
-              <a:buNone/>
-              <a:defRPr sz="5832" b="1"/>
+            <a:lvl9pPr marL="14918338" indent="0">
+              <a:buNone/>
+              <a:defRPr sz="6609" b="1"/>
             </a:lvl9pPr>
           </a:lstStyle>
           <a:p>
@@ -1690,39 +1690,39 @@
         </p:nvSpPr>
         <p:spPr>
           <a:xfrm>
-            <a:off x="6967544" y="2609851"/>
-            <a:ext cx="6062665" cy="4741549"/>
+            <a:off x="7896551" y="2609852"/>
+            <a:ext cx="6871020" cy="4741549"/>
           </a:xfrm>
         </p:spPr>
         <p:txBody>
           <a:bodyPr/>
           <a:lstStyle>
             <a:lvl1pPr>
-              <a:defRPr sz="8749"/>
+              <a:defRPr sz="9915"/>
             </a:lvl1pPr>
             <a:lvl2pPr>
-              <a:defRPr sz="7780"/>
+              <a:defRPr sz="8817"/>
             </a:lvl2pPr>
             <a:lvl3pPr>
-              <a:defRPr sz="6805"/>
+              <a:defRPr sz="7712"/>
             </a:lvl3pPr>
             <a:lvl4pPr>
-              <a:defRPr sz="5832"/>
+              <a:defRPr sz="6609"/>
             </a:lvl4pPr>
             <a:lvl5pPr>
-              <a:defRPr sz="5832"/>
+              <a:defRPr sz="6609"/>
             </a:lvl5pPr>
             <a:lvl6pPr>
-              <a:defRPr sz="5832"/>
+              <a:defRPr sz="6609"/>
             </a:lvl6pPr>
             <a:lvl7pPr>
-              <a:defRPr sz="5832"/>
+              <a:defRPr sz="6609"/>
             </a:lvl7pPr>
             <a:lvl8pPr>
-              <a:defRPr sz="5832"/>
+              <a:defRPr sz="6609"/>
             </a:lvl8pPr>
             <a:lvl9pPr>
-              <a:defRPr sz="5832"/>
+              <a:defRPr sz="6609"/>
             </a:lvl9pPr>
           </a:lstStyle>
           <a:p>
@@ -1780,7 +1780,7 @@
           <a:p>
             <a:fld id="{01197F44-DB72-474A-9754-31703E05C006}" type="datetimeFigureOut">
               <a:rPr lang="en-US" smtClean="0"/>
-              <a:t>10/1/19</a:t>
+              <a:t>10/17/19</a:t>
             </a:fld>
             <a:endParaRPr lang="en-US"/>
           </a:p>
@@ -1898,7 +1898,7 @@
           <a:p>
             <a:fld id="{01197F44-DB72-474A-9754-31703E05C006}" type="datetimeFigureOut">
               <a:rPr lang="en-US" smtClean="0"/>
-              <a:t>10/1/19</a:t>
+              <a:t>10/17/19</a:t>
             </a:fld>
             <a:endParaRPr lang="en-US"/>
           </a:p>
@@ -1993,7 +1993,7 @@
           <a:p>
             <a:fld id="{01197F44-DB72-474A-9754-31703E05C006}" type="datetimeFigureOut">
               <a:rPr lang="en-US" smtClean="0"/>
-              <a:t>10/1/19</a:t>
+              <a:t>10/17/19</a:t>
             </a:fld>
             <a:endParaRPr lang="en-US"/>
           </a:p>
@@ -2083,15 +2083,15 @@
         </p:nvSpPr>
         <p:spPr>
           <a:xfrm>
-            <a:off x="685811" y="327671"/>
-            <a:ext cx="4512468" cy="1394458"/>
+            <a:off x="777253" y="327671"/>
+            <a:ext cx="5114130" cy="1394458"/>
           </a:xfrm>
         </p:spPr>
         <p:txBody>
           <a:bodyPr anchor="b"/>
           <a:lstStyle>
             <a:lvl1pPr algn="l">
-              <a:defRPr sz="7780" b="1"/>
+              <a:defRPr sz="8817" b="1"/>
             </a:lvl1pPr>
           </a:lstStyle>
           <a:p>
@@ -2115,39 +2115,39 @@
         </p:nvSpPr>
         <p:spPr>
           <a:xfrm>
-            <a:off x="5362587" y="327669"/>
-            <a:ext cx="7667627" cy="7023735"/>
+            <a:off x="6077599" y="327670"/>
+            <a:ext cx="8689977" cy="7023735"/>
           </a:xfrm>
         </p:spPr>
         <p:txBody>
           <a:bodyPr/>
           <a:lstStyle>
             <a:lvl1pPr>
-              <a:defRPr sz="12640"/>
+              <a:defRPr sz="14325"/>
             </a:lvl1pPr>
             <a:lvl2pPr>
-              <a:defRPr sz="10692"/>
+              <a:defRPr sz="12117"/>
             </a:lvl2pPr>
             <a:lvl3pPr>
-              <a:defRPr sz="8749"/>
+              <a:defRPr sz="9915"/>
             </a:lvl3pPr>
             <a:lvl4pPr>
-              <a:defRPr sz="7780"/>
+              <a:defRPr sz="8817"/>
             </a:lvl4pPr>
             <a:lvl5pPr>
-              <a:defRPr sz="7780"/>
+              <a:defRPr sz="8817"/>
             </a:lvl5pPr>
             <a:lvl6pPr>
-              <a:defRPr sz="7780"/>
+              <a:defRPr sz="8817"/>
             </a:lvl6pPr>
             <a:lvl7pPr>
-              <a:defRPr sz="7780"/>
+              <a:defRPr sz="8817"/>
             </a:lvl7pPr>
             <a:lvl8pPr>
-              <a:defRPr sz="7780"/>
+              <a:defRPr sz="8817"/>
             </a:lvl8pPr>
             <a:lvl9pPr>
-              <a:defRPr sz="7780"/>
+              <a:defRPr sz="8817"/>
             </a:lvl9pPr>
           </a:lstStyle>
           <a:p>
@@ -2200,8 +2200,8 @@
         </p:nvSpPr>
         <p:spPr>
           <a:xfrm>
-            <a:off x="685811" y="1722132"/>
-            <a:ext cx="4512468" cy="5629277"/>
+            <a:off x="777253" y="1722133"/>
+            <a:ext cx="5114130" cy="5629277"/>
           </a:xfrm>
         </p:spPr>
         <p:txBody>
@@ -2209,39 +2209,39 @@
           <a:lstStyle>
             <a:lvl1pPr marL="0" indent="0">
               <a:buNone/>
-              <a:defRPr sz="4860"/>
+              <a:defRPr sz="5508"/>
             </a:lvl1pPr>
-            <a:lvl2pPr marL="1645445" indent="0">
-              <a:buNone/>
-              <a:defRPr sz="3888"/>
+            <a:lvl2pPr marL="1864783" indent="0">
+              <a:buNone/>
+              <a:defRPr sz="4406"/>
             </a:lvl2pPr>
-            <a:lvl3pPr marL="3290906" indent="0">
-              <a:buNone/>
-              <a:defRPr sz="2915"/>
+            <a:lvl3pPr marL="3729584" indent="0">
+              <a:buNone/>
+              <a:defRPr sz="3304"/>
             </a:lvl3pPr>
-            <a:lvl4pPr marL="4936352" indent="0">
-              <a:buNone/>
-              <a:defRPr sz="2915"/>
+            <a:lvl4pPr marL="5594368" indent="0">
+              <a:buNone/>
+              <a:defRPr sz="3304"/>
             </a:lvl4pPr>
-            <a:lvl5pPr marL="6581797" indent="0">
-              <a:buNone/>
-              <a:defRPr sz="2915"/>
+            <a:lvl5pPr marL="7459151" indent="0">
+              <a:buNone/>
+              <a:defRPr sz="3304"/>
             </a:lvl5pPr>
-            <a:lvl6pPr marL="8227261" indent="0">
-              <a:buNone/>
-              <a:defRPr sz="2915"/>
+            <a:lvl6pPr marL="9323955" indent="0">
+              <a:buNone/>
+              <a:defRPr sz="3304"/>
             </a:lvl6pPr>
-            <a:lvl7pPr marL="9872706" indent="0">
-              <a:buNone/>
-              <a:defRPr sz="2915"/>
+            <a:lvl7pPr marL="11188738" indent="0">
+              <a:buNone/>
+              <a:defRPr sz="3304"/>
             </a:lvl7pPr>
-            <a:lvl8pPr marL="11518169" indent="0">
-              <a:buNone/>
-              <a:defRPr sz="2915"/>
+            <a:lvl8pPr marL="13053541" indent="0">
+              <a:buNone/>
+              <a:defRPr sz="3304"/>
             </a:lvl8pPr>
-            <a:lvl9pPr marL="13163627" indent="0">
-              <a:buNone/>
-              <a:defRPr sz="2915"/>
+            <a:lvl9pPr marL="14918338" indent="0">
+              <a:buNone/>
+              <a:defRPr sz="3304"/>
             </a:lvl9pPr>
           </a:lstStyle>
           <a:p>
@@ -2270,7 +2270,7 @@
           <a:p>
             <a:fld id="{01197F44-DB72-474A-9754-31703E05C006}" type="datetimeFigureOut">
               <a:rPr lang="en-US" smtClean="0"/>
-              <a:t>10/1/19</a:t>
+              <a:t>10/17/19</a:t>
             </a:fld>
             <a:endParaRPr lang="en-US"/>
           </a:p>
@@ -2360,15 +2360,15 @@
         </p:nvSpPr>
         <p:spPr>
           <a:xfrm>
-            <a:off x="2688438" y="5760733"/>
-            <a:ext cx="8229600" cy="680083"/>
+            <a:off x="3046896" y="5760734"/>
+            <a:ext cx="9326880" cy="680083"/>
           </a:xfrm>
         </p:spPr>
         <p:txBody>
           <a:bodyPr anchor="b"/>
           <a:lstStyle>
             <a:lvl1pPr algn="l">
-              <a:defRPr sz="7780" b="1"/>
+              <a:defRPr sz="8817" b="1"/>
             </a:lvl1pPr>
           </a:lstStyle>
           <a:p>
@@ -2392,8 +2392,8 @@
         </p:nvSpPr>
         <p:spPr>
           <a:xfrm>
-            <a:off x="2688438" y="735332"/>
-            <a:ext cx="8229600" cy="4937760"/>
+            <a:off x="3046896" y="735332"/>
+            <a:ext cx="9326880" cy="4937760"/>
           </a:xfrm>
         </p:spPr>
         <p:txBody>
@@ -2401,39 +2401,39 @@
           <a:lstStyle>
             <a:lvl1pPr marL="0" indent="0">
               <a:buNone/>
-              <a:defRPr sz="12640"/>
+              <a:defRPr sz="14325"/>
             </a:lvl1pPr>
-            <a:lvl2pPr marL="1645445" indent="0">
-              <a:buNone/>
-              <a:defRPr sz="10692"/>
+            <a:lvl2pPr marL="1864783" indent="0">
+              <a:buNone/>
+              <a:defRPr sz="12117"/>
             </a:lvl2pPr>
-            <a:lvl3pPr marL="3290906" indent="0">
-              <a:buNone/>
-              <a:defRPr sz="8749"/>
+            <a:lvl3pPr marL="3729584" indent="0">
+              <a:buNone/>
+              <a:defRPr sz="9915"/>
             </a:lvl3pPr>
-            <a:lvl4pPr marL="4936352" indent="0">
-              <a:buNone/>
-              <a:defRPr sz="7780"/>
+            <a:lvl4pPr marL="5594368" indent="0">
+              <a:buNone/>
+              <a:defRPr sz="8817"/>
             </a:lvl4pPr>
-            <a:lvl5pPr marL="6581797" indent="0">
-              <a:buNone/>
-              <a:defRPr sz="7780"/>
+            <a:lvl5pPr marL="7459151" indent="0">
+              <a:buNone/>
+              <a:defRPr sz="8817"/>
             </a:lvl5pPr>
-            <a:lvl6pPr marL="8227261" indent="0">
-              <a:buNone/>
-              <a:defRPr sz="7780"/>
+            <a:lvl6pPr marL="9323955" indent="0">
+              <a:buNone/>
+              <a:defRPr sz="8817"/>
             </a:lvl6pPr>
-            <a:lvl7pPr marL="9872706" indent="0">
-              <a:buNone/>
-              <a:defRPr sz="7780"/>
+            <a:lvl7pPr marL="11188738" indent="0">
+              <a:buNone/>
+              <a:defRPr sz="8817"/>
             </a:lvl7pPr>
-            <a:lvl8pPr marL="11518169" indent="0">
-              <a:buNone/>
-              <a:defRPr sz="7780"/>
+            <a:lvl8pPr marL="13053541" indent="0">
+              <a:buNone/>
+              <a:defRPr sz="8817"/>
             </a:lvl8pPr>
-            <a:lvl9pPr marL="13163627" indent="0">
-              <a:buNone/>
-              <a:defRPr sz="7780"/>
+            <a:lvl9pPr marL="14918338" indent="0">
+              <a:buNone/>
+              <a:defRPr sz="8817"/>
             </a:lvl9pPr>
           </a:lstStyle>
           <a:p>
@@ -2453,8 +2453,8 @@
         </p:nvSpPr>
         <p:spPr>
           <a:xfrm>
-            <a:off x="2688438" y="6440815"/>
-            <a:ext cx="8229600" cy="965837"/>
+            <a:off x="3046896" y="6440816"/>
+            <a:ext cx="9326880" cy="965837"/>
           </a:xfrm>
         </p:spPr>
         <p:txBody>
@@ -2462,39 +2462,39 @@
           <a:lstStyle>
             <a:lvl1pPr marL="0" indent="0">
               <a:buNone/>
-              <a:defRPr sz="4860"/>
+              <a:defRPr sz="5508"/>
             </a:lvl1pPr>
-            <a:lvl2pPr marL="1645445" indent="0">
-              <a:buNone/>
-              <a:defRPr sz="3888"/>
+            <a:lvl2pPr marL="1864783" indent="0">
+              <a:buNone/>
+              <a:defRPr sz="4406"/>
             </a:lvl2pPr>
-            <a:lvl3pPr marL="3290906" indent="0">
-              <a:buNone/>
-              <a:defRPr sz="2915"/>
+            <a:lvl3pPr marL="3729584" indent="0">
+              <a:buNone/>
+              <a:defRPr sz="3304"/>
             </a:lvl3pPr>
-            <a:lvl4pPr marL="4936352" indent="0">
-              <a:buNone/>
-              <a:defRPr sz="2915"/>
+            <a:lvl4pPr marL="5594368" indent="0">
+              <a:buNone/>
+              <a:defRPr sz="3304"/>
             </a:lvl4pPr>
-            <a:lvl5pPr marL="6581797" indent="0">
-              <a:buNone/>
-              <a:defRPr sz="2915"/>
+            <a:lvl5pPr marL="7459151" indent="0">
+              <a:buNone/>
+              <a:defRPr sz="3304"/>
             </a:lvl5pPr>
-            <a:lvl6pPr marL="8227261" indent="0">
-              <a:buNone/>
-              <a:defRPr sz="2915"/>
+            <a:lvl6pPr marL="9323955" indent="0">
+              <a:buNone/>
+              <a:defRPr sz="3304"/>
             </a:lvl6pPr>
-            <a:lvl7pPr marL="9872706" indent="0">
-              <a:buNone/>
-              <a:defRPr sz="2915"/>
+            <a:lvl7pPr marL="11188738" indent="0">
+              <a:buNone/>
+              <a:defRPr sz="3304"/>
             </a:lvl7pPr>
-            <a:lvl8pPr marL="11518169" indent="0">
-              <a:buNone/>
-              <a:defRPr sz="2915"/>
+            <a:lvl8pPr marL="13053541" indent="0">
+              <a:buNone/>
+              <a:defRPr sz="3304"/>
             </a:lvl8pPr>
-            <a:lvl9pPr marL="13163627" indent="0">
-              <a:buNone/>
-              <a:defRPr sz="2915"/>
+            <a:lvl9pPr marL="14918338" indent="0">
+              <a:buNone/>
+              <a:defRPr sz="3304"/>
             </a:lvl9pPr>
           </a:lstStyle>
           <a:p>
@@ -2523,7 +2523,7 @@
           <a:p>
             <a:fld id="{01197F44-DB72-474A-9754-31703E05C006}" type="datetimeFigureOut">
               <a:rPr lang="en-US" smtClean="0"/>
-              <a:t>10/1/19</a:t>
+              <a:t>10/17/19</a:t>
             </a:fld>
             <a:endParaRPr lang="en-US"/>
           </a:p>
@@ -2618,8 +2618,8 @@
         </p:nvSpPr>
         <p:spPr>
           <a:xfrm>
-            <a:off x="685811" y="329573"/>
-            <a:ext cx="12344402" cy="1371600"/>
+            <a:off x="777253" y="329573"/>
+            <a:ext cx="13990322" cy="1371600"/>
           </a:xfrm>
           <a:prstGeom prst="rect">
             <a:avLst/>
@@ -2651,8 +2651,8 @@
         </p:nvSpPr>
         <p:spPr>
           <a:xfrm>
-            <a:off x="685811" y="1920257"/>
-            <a:ext cx="12344402" cy="5431156"/>
+            <a:off x="777253" y="1920257"/>
+            <a:ext cx="13990322" cy="5431156"/>
           </a:xfrm>
           <a:prstGeom prst="rect">
             <a:avLst/>
@@ -2713,8 +2713,8 @@
         </p:nvSpPr>
         <p:spPr>
           <a:xfrm>
-            <a:off x="685800" y="7627629"/>
-            <a:ext cx="3200400" cy="438149"/>
+            <a:off x="777240" y="7627630"/>
+            <a:ext cx="3627120" cy="438149"/>
           </a:xfrm>
           <a:prstGeom prst="rect">
             <a:avLst/>
@@ -2724,7 +2724,7 @@
           <a:bodyPr vert="horz" lIns="67711" tIns="33854" rIns="67711" bIns="33854" rtlCol="0" anchor="ctr"/>
           <a:lstStyle>
             <a:lvl1pPr algn="l">
-              <a:defRPr sz="3888">
+              <a:defRPr sz="4406">
                 <a:solidFill>
                   <a:schemeClr val="tx1">
                     <a:tint val="75000"/>
@@ -2736,7 +2736,7 @@
           <a:p>
             <a:fld id="{01197F44-DB72-474A-9754-31703E05C006}" type="datetimeFigureOut">
               <a:rPr lang="en-US" smtClean="0"/>
-              <a:t>10/1/19</a:t>
+              <a:t>10/17/19</a:t>
             </a:fld>
             <a:endParaRPr lang="en-US"/>
           </a:p>
@@ -2754,8 +2754,8 @@
         </p:nvSpPr>
         <p:spPr>
           <a:xfrm>
-            <a:off x="4686300" y="7627629"/>
-            <a:ext cx="4343403" cy="438149"/>
+            <a:off x="5311141" y="7627630"/>
+            <a:ext cx="4922523" cy="438149"/>
           </a:xfrm>
           <a:prstGeom prst="rect">
             <a:avLst/>
@@ -2765,7 +2765,7 @@
           <a:bodyPr vert="horz" lIns="67711" tIns="33854" rIns="67711" bIns="33854" rtlCol="0" anchor="ctr"/>
           <a:lstStyle>
             <a:lvl1pPr algn="ctr">
-              <a:defRPr sz="3888">
+              <a:defRPr sz="4406">
                 <a:solidFill>
                   <a:schemeClr val="tx1">
                     <a:tint val="75000"/>
@@ -2791,8 +2791,8 @@
         </p:nvSpPr>
         <p:spPr>
           <a:xfrm>
-            <a:off x="9829800" y="7627629"/>
-            <a:ext cx="3200400" cy="438149"/>
+            <a:off x="11140440" y="7627630"/>
+            <a:ext cx="3627120" cy="438149"/>
           </a:xfrm>
           <a:prstGeom prst="rect">
             <a:avLst/>
@@ -2802,7 +2802,7 @@
           <a:bodyPr vert="horz" lIns="67711" tIns="33854" rIns="67711" bIns="33854" rtlCol="0" anchor="ctr"/>
           <a:lstStyle>
             <a:lvl1pPr algn="r">
-              <a:defRPr sz="3888">
+              <a:defRPr sz="4406">
                 <a:solidFill>
                   <a:schemeClr val="tx1">
                     <a:tint val="75000"/>
@@ -2843,12 +2843,12 @@
   </p:sldLayoutIdLst>
   <p:txStyles>
     <p:titleStyle>
-      <a:lvl1pPr algn="ctr" defTabSz="1645445" rtl="0" eaLnBrk="1" latinLnBrk="0" hangingPunct="1">
+      <a:lvl1pPr algn="ctr" defTabSz="1864783" rtl="0" eaLnBrk="1" latinLnBrk="0" hangingPunct="1">
         <a:spcBef>
           <a:spcPct val="0"/>
         </a:spcBef>
         <a:buNone/>
-        <a:defRPr sz="15552" kern="1200">
+        <a:defRPr sz="17625" kern="1200">
           <a:solidFill>
             <a:schemeClr val="tx1"/>
           </a:solidFill>
@@ -2859,13 +2859,13 @@
       </a:lvl1pPr>
     </p:titleStyle>
     <p:bodyStyle>
-      <a:lvl1pPr marL="1234083" indent="-1234083" algn="l" defTabSz="1645445" rtl="0" eaLnBrk="1" latinLnBrk="0" hangingPunct="1">
+      <a:lvl1pPr marL="1398586" indent="-1398586" algn="l" defTabSz="1864783" rtl="0" eaLnBrk="1" latinLnBrk="0" hangingPunct="1">
         <a:spcBef>
           <a:spcPct val="20000"/>
         </a:spcBef>
         <a:buFont typeface="Arial"/>
         <a:buChar char="•"/>
-        <a:defRPr sz="12640" kern="1200">
+        <a:defRPr sz="14325" kern="1200">
           <a:solidFill>
             <a:schemeClr val="tx1"/>
           </a:solidFill>
@@ -2874,13 +2874,13 @@
           <a:cs typeface="+mn-cs"/>
         </a:defRPr>
       </a:lvl1pPr>
-      <a:lvl2pPr marL="2673863" indent="-1028402" algn="l" defTabSz="1645445" rtl="0" eaLnBrk="1" latinLnBrk="0" hangingPunct="1">
+      <a:lvl2pPr marL="3030289" indent="-1165488" algn="l" defTabSz="1864783" rtl="0" eaLnBrk="1" latinLnBrk="0" hangingPunct="1">
         <a:spcBef>
           <a:spcPct val="20000"/>
         </a:spcBef>
         <a:buFont typeface="Arial"/>
         <a:buChar char="–"/>
-        <a:defRPr sz="10692" kern="1200">
+        <a:defRPr sz="12117" kern="1200">
           <a:solidFill>
             <a:schemeClr val="tx1"/>
           </a:solidFill>
@@ -2889,13 +2889,13 @@
           <a:cs typeface="+mn-cs"/>
         </a:defRPr>
       </a:lvl2pPr>
-      <a:lvl3pPr marL="4113632" indent="-822715" algn="l" defTabSz="1645445" rtl="0" eaLnBrk="1" latinLnBrk="0" hangingPunct="1">
+      <a:lvl3pPr marL="4661979" indent="-932383" algn="l" defTabSz="1864783" rtl="0" eaLnBrk="1" latinLnBrk="0" hangingPunct="1">
         <a:spcBef>
           <a:spcPct val="20000"/>
         </a:spcBef>
         <a:buFont typeface="Arial"/>
         <a:buChar char="•"/>
-        <a:defRPr sz="8749" kern="1200">
+        <a:defRPr sz="9915" kern="1200">
           <a:solidFill>
             <a:schemeClr val="tx1"/>
           </a:solidFill>
@@ -2904,13 +2904,13 @@
           <a:cs typeface="+mn-cs"/>
         </a:defRPr>
       </a:lvl3pPr>
-      <a:lvl4pPr marL="5759077" indent="-822715" algn="l" defTabSz="1645445" rtl="0" eaLnBrk="1" latinLnBrk="0" hangingPunct="1">
+      <a:lvl4pPr marL="6526762" indent="-932383" algn="l" defTabSz="1864783" rtl="0" eaLnBrk="1" latinLnBrk="0" hangingPunct="1">
         <a:spcBef>
           <a:spcPct val="20000"/>
         </a:spcBef>
         <a:buFont typeface="Arial"/>
         <a:buChar char="–"/>
-        <a:defRPr sz="7780" kern="1200">
+        <a:defRPr sz="8817" kern="1200">
           <a:solidFill>
             <a:schemeClr val="tx1"/>
           </a:solidFill>
@@ -2919,13 +2919,13 @@
           <a:cs typeface="+mn-cs"/>
         </a:defRPr>
       </a:lvl4pPr>
-      <a:lvl5pPr marL="7404538" indent="-822715" algn="l" defTabSz="1645445" rtl="0" eaLnBrk="1" latinLnBrk="0" hangingPunct="1">
+      <a:lvl5pPr marL="8391563" indent="-932383" algn="l" defTabSz="1864783" rtl="0" eaLnBrk="1" latinLnBrk="0" hangingPunct="1">
         <a:spcBef>
           <a:spcPct val="20000"/>
         </a:spcBef>
         <a:buFont typeface="Arial"/>
         <a:buChar char="»"/>
-        <a:defRPr sz="7780" kern="1200">
+        <a:defRPr sz="8817" kern="1200">
           <a:solidFill>
             <a:schemeClr val="tx1"/>
           </a:solidFill>
@@ -2934,13 +2934,13 @@
           <a:cs typeface="+mn-cs"/>
         </a:defRPr>
       </a:lvl5pPr>
-      <a:lvl6pPr marL="9049994" indent="-822715" algn="l" defTabSz="1645445" rtl="0" eaLnBrk="1" latinLnBrk="0" hangingPunct="1">
+      <a:lvl6pPr marL="10256358" indent="-932383" algn="l" defTabSz="1864783" rtl="0" eaLnBrk="1" latinLnBrk="0" hangingPunct="1">
         <a:spcBef>
           <a:spcPct val="20000"/>
         </a:spcBef>
         <a:buFont typeface="Arial"/>
         <a:buChar char="•"/>
-        <a:defRPr sz="7780" kern="1200">
+        <a:defRPr sz="8817" kern="1200">
           <a:solidFill>
             <a:schemeClr val="tx1"/>
           </a:solidFill>
@@ -2949,13 +2949,13 @@
           <a:cs typeface="+mn-cs"/>
         </a:defRPr>
       </a:lvl6pPr>
-      <a:lvl7pPr marL="10695449" indent="-822715" algn="l" defTabSz="1645445" rtl="0" eaLnBrk="1" latinLnBrk="0" hangingPunct="1">
+      <a:lvl7pPr marL="12121152" indent="-932383" algn="l" defTabSz="1864783" rtl="0" eaLnBrk="1" latinLnBrk="0" hangingPunct="1">
         <a:spcBef>
           <a:spcPct val="20000"/>
         </a:spcBef>
         <a:buFont typeface="Arial"/>
         <a:buChar char="•"/>
-        <a:defRPr sz="7780" kern="1200">
+        <a:defRPr sz="8817" kern="1200">
           <a:solidFill>
             <a:schemeClr val="tx1"/>
           </a:solidFill>
@@ -2964,13 +2964,13 @@
           <a:cs typeface="+mn-cs"/>
         </a:defRPr>
       </a:lvl7pPr>
-      <a:lvl8pPr marL="12340893" indent="-822715" algn="l" defTabSz="1645445" rtl="0" eaLnBrk="1" latinLnBrk="0" hangingPunct="1">
+      <a:lvl8pPr marL="13985934" indent="-932383" algn="l" defTabSz="1864783" rtl="0" eaLnBrk="1" latinLnBrk="0" hangingPunct="1">
         <a:spcBef>
           <a:spcPct val="20000"/>
         </a:spcBef>
         <a:buFont typeface="Arial"/>
         <a:buChar char="•"/>
-        <a:defRPr sz="7780" kern="1200">
+        <a:defRPr sz="8817" kern="1200">
           <a:solidFill>
             <a:schemeClr val="tx1"/>
           </a:solidFill>
@@ -2979,13 +2979,13 @@
           <a:cs typeface="+mn-cs"/>
         </a:defRPr>
       </a:lvl8pPr>
-      <a:lvl9pPr marL="13986351" indent="-822715" algn="l" defTabSz="1645445" rtl="0" eaLnBrk="1" latinLnBrk="0" hangingPunct="1">
+      <a:lvl9pPr marL="15850732" indent="-932383" algn="l" defTabSz="1864783" rtl="0" eaLnBrk="1" latinLnBrk="0" hangingPunct="1">
         <a:spcBef>
           <a:spcPct val="20000"/>
         </a:spcBef>
         <a:buFont typeface="Arial"/>
         <a:buChar char="•"/>
-        <a:defRPr sz="7780" kern="1200">
+        <a:defRPr sz="8817" kern="1200">
           <a:solidFill>
             <a:schemeClr val="tx1"/>
           </a:solidFill>
@@ -2999,8 +2999,8 @@
       <a:defPPr>
         <a:defRPr lang="en-US"/>
       </a:defPPr>
-      <a:lvl1pPr marL="0" algn="l" defTabSz="1645445" rtl="0" eaLnBrk="1" latinLnBrk="0" hangingPunct="1">
-        <a:defRPr sz="6805" kern="1200">
+      <a:lvl1pPr marL="0" algn="l" defTabSz="1864783" rtl="0" eaLnBrk="1" latinLnBrk="0" hangingPunct="1">
+        <a:defRPr sz="7712" kern="1200">
           <a:solidFill>
             <a:schemeClr val="tx1"/>
           </a:solidFill>
@@ -3009,8 +3009,8 @@
           <a:cs typeface="+mn-cs"/>
         </a:defRPr>
       </a:lvl1pPr>
-      <a:lvl2pPr marL="1645445" algn="l" defTabSz="1645445" rtl="0" eaLnBrk="1" latinLnBrk="0" hangingPunct="1">
-        <a:defRPr sz="6805" kern="1200">
+      <a:lvl2pPr marL="1864783" algn="l" defTabSz="1864783" rtl="0" eaLnBrk="1" latinLnBrk="0" hangingPunct="1">
+        <a:defRPr sz="7712" kern="1200">
           <a:solidFill>
             <a:schemeClr val="tx1"/>
           </a:solidFill>
@@ -3019,8 +3019,8 @@
           <a:cs typeface="+mn-cs"/>
         </a:defRPr>
       </a:lvl2pPr>
-      <a:lvl3pPr marL="3290906" algn="l" defTabSz="1645445" rtl="0" eaLnBrk="1" latinLnBrk="0" hangingPunct="1">
-        <a:defRPr sz="6805" kern="1200">
+      <a:lvl3pPr marL="3729584" algn="l" defTabSz="1864783" rtl="0" eaLnBrk="1" latinLnBrk="0" hangingPunct="1">
+        <a:defRPr sz="7712" kern="1200">
           <a:solidFill>
             <a:schemeClr val="tx1"/>
           </a:solidFill>
@@ -3029,8 +3029,8 @@
           <a:cs typeface="+mn-cs"/>
         </a:defRPr>
       </a:lvl3pPr>
-      <a:lvl4pPr marL="4936352" algn="l" defTabSz="1645445" rtl="0" eaLnBrk="1" latinLnBrk="0" hangingPunct="1">
-        <a:defRPr sz="6805" kern="1200">
+      <a:lvl4pPr marL="5594368" algn="l" defTabSz="1864783" rtl="0" eaLnBrk="1" latinLnBrk="0" hangingPunct="1">
+        <a:defRPr sz="7712" kern="1200">
           <a:solidFill>
             <a:schemeClr val="tx1"/>
           </a:solidFill>
@@ -3039,8 +3039,8 @@
           <a:cs typeface="+mn-cs"/>
         </a:defRPr>
       </a:lvl4pPr>
-      <a:lvl5pPr marL="6581797" algn="l" defTabSz="1645445" rtl="0" eaLnBrk="1" latinLnBrk="0" hangingPunct="1">
-        <a:defRPr sz="6805" kern="1200">
+      <a:lvl5pPr marL="7459151" algn="l" defTabSz="1864783" rtl="0" eaLnBrk="1" latinLnBrk="0" hangingPunct="1">
+        <a:defRPr sz="7712" kern="1200">
           <a:solidFill>
             <a:schemeClr val="tx1"/>
           </a:solidFill>
@@ -3049,8 +3049,8 @@
           <a:cs typeface="+mn-cs"/>
         </a:defRPr>
       </a:lvl5pPr>
-      <a:lvl6pPr marL="8227261" algn="l" defTabSz="1645445" rtl="0" eaLnBrk="1" latinLnBrk="0" hangingPunct="1">
-        <a:defRPr sz="6805" kern="1200">
+      <a:lvl6pPr marL="9323955" algn="l" defTabSz="1864783" rtl="0" eaLnBrk="1" latinLnBrk="0" hangingPunct="1">
+        <a:defRPr sz="7712" kern="1200">
           <a:solidFill>
             <a:schemeClr val="tx1"/>
           </a:solidFill>
@@ -3059,8 +3059,8 @@
           <a:cs typeface="+mn-cs"/>
         </a:defRPr>
       </a:lvl6pPr>
-      <a:lvl7pPr marL="9872706" algn="l" defTabSz="1645445" rtl="0" eaLnBrk="1" latinLnBrk="0" hangingPunct="1">
-        <a:defRPr sz="6805" kern="1200">
+      <a:lvl7pPr marL="11188738" algn="l" defTabSz="1864783" rtl="0" eaLnBrk="1" latinLnBrk="0" hangingPunct="1">
+        <a:defRPr sz="7712" kern="1200">
           <a:solidFill>
             <a:schemeClr val="tx1"/>
           </a:solidFill>
@@ -3069,8 +3069,8 @@
           <a:cs typeface="+mn-cs"/>
         </a:defRPr>
       </a:lvl7pPr>
-      <a:lvl8pPr marL="11518169" algn="l" defTabSz="1645445" rtl="0" eaLnBrk="1" latinLnBrk="0" hangingPunct="1">
-        <a:defRPr sz="6805" kern="1200">
+      <a:lvl8pPr marL="13053541" algn="l" defTabSz="1864783" rtl="0" eaLnBrk="1" latinLnBrk="0" hangingPunct="1">
+        <a:defRPr sz="7712" kern="1200">
           <a:solidFill>
             <a:schemeClr val="tx1"/>
           </a:solidFill>
@@ -3079,8 +3079,8 @@
           <a:cs typeface="+mn-cs"/>
         </a:defRPr>
       </a:lvl8pPr>
-      <a:lvl9pPr marL="13163627" algn="l" defTabSz="1645445" rtl="0" eaLnBrk="1" latinLnBrk="0" hangingPunct="1">
-        <a:defRPr sz="6805" kern="1200">
+      <a:lvl9pPr marL="14918338" algn="l" defTabSz="1864783" rtl="0" eaLnBrk="1" latinLnBrk="0" hangingPunct="1">
+        <a:defRPr sz="7712" kern="1200">
           <a:solidFill>
             <a:schemeClr val="tx1"/>
           </a:solidFill>
@@ -3111,15 +3111,45 @@
           <a:chExt cx="0" cy="0"/>
         </a:xfrm>
       </p:grpSpPr>
-      <p:sp>
-        <p:nvSpPr>
-          <p:cNvPr id="12" name="Rectangle 11"/>
+      <p:pic>
+        <p:nvPicPr>
+          <p:cNvPr id="23" name="Picture 22"/>
+          <p:cNvPicPr>
+            <a:picLocks noChangeAspect="1"/>
+          </p:cNvPicPr>
+          <p:nvPr/>
+        </p:nvPicPr>
+        <p:blipFill>
+          <a:blip r:embed="rId2">
+            <a:extLst>
+              <a:ext uri="{28A0092B-C50C-407E-A947-70E740481C1C}">
+                <a14:useLocalDpi xmlns:a14="http://schemas.microsoft.com/office/drawing/2010/main" val="0"/>
+              </a:ext>
+            </a:extLst>
+          </a:blip>
+          <a:stretch>
+            <a:fillRect/>
+          </a:stretch>
+        </p:blipFill>
+        <p:spPr>
+          <a:xfrm>
+            <a:off x="12031806" y="291984"/>
+            <a:ext cx="3512994" cy="7281721"/>
+          </a:xfrm>
+          <a:prstGeom prst="rect">
+            <a:avLst/>
+          </a:prstGeom>
+        </p:spPr>
+      </p:pic>
+      <p:sp>
+        <p:nvSpPr>
+          <p:cNvPr id="11" name="Rectangle 10"/>
           <p:cNvSpPr/>
           <p:nvPr/>
         </p:nvSpPr>
         <p:spPr>
           <a:xfrm>
-            <a:off x="10015536" y="7589005"/>
+            <a:off x="11844336" y="7589005"/>
             <a:ext cx="3227191" cy="584775"/>
           </a:xfrm>
           <a:prstGeom prst="rect">
@@ -3167,7 +3197,7 @@
       </p:sp>
       <p:sp>
         <p:nvSpPr>
-          <p:cNvPr id="13" name="Rectangle 12"/>
+          <p:cNvPr id="15" name="Rectangle 14"/>
           <p:cNvSpPr/>
           <p:nvPr/>
         </p:nvSpPr>
@@ -3197,13 +3227,13 @@
       </p:sp>
       <p:sp>
         <p:nvSpPr>
-          <p:cNvPr id="14" name="Rectangle 13"/>
+          <p:cNvPr id="17" name="Rectangle 16"/>
           <p:cNvSpPr/>
           <p:nvPr/>
         </p:nvSpPr>
         <p:spPr>
           <a:xfrm>
-            <a:off x="6297277" y="138785"/>
+            <a:off x="4609178" y="168373"/>
             <a:ext cx="503573" cy="461665"/>
           </a:xfrm>
           <a:prstGeom prst="rect">
@@ -3226,7 +3256,7 @@
       </p:sp>
       <p:sp>
         <p:nvSpPr>
-          <p:cNvPr id="7" name="Rectangle 6"/>
+          <p:cNvPr id="18" name="Rectangle 17"/>
           <p:cNvSpPr/>
           <p:nvPr/>
         </p:nvSpPr>
@@ -3279,13 +3309,13 @@
       </p:sp>
       <p:sp>
         <p:nvSpPr>
-          <p:cNvPr id="10" name="Rectangle 9"/>
+          <p:cNvPr id="19" name="Rectangle 18"/>
           <p:cNvSpPr/>
           <p:nvPr/>
         </p:nvSpPr>
         <p:spPr>
           <a:xfrm>
-            <a:off x="5342603" y="7573705"/>
+            <a:off x="8198412" y="7573705"/>
             <a:ext cx="3352800" cy="584775"/>
           </a:xfrm>
           <a:prstGeom prst="rect">
@@ -3332,14 +3362,14 @@
       </p:sp>
       <p:sp>
         <p:nvSpPr>
-          <p:cNvPr id="16" name="Rectangle 15"/>
+          <p:cNvPr id="20" name="Rectangle 19"/>
           <p:cNvSpPr/>
           <p:nvPr/>
         </p:nvSpPr>
         <p:spPr>
           <a:xfrm>
-            <a:off x="10640678" y="168373"/>
-            <a:ext cx="210804" cy="461665"/>
+            <a:off x="12198525" y="168373"/>
+            <a:ext cx="481757" cy="461665"/>
           </a:xfrm>
           <a:prstGeom prst="rect">
             <a:avLst/>
@@ -3353,8 +3383,8 @@
           <a:p>
             <a:pPr algn="ctr"/>
             <a:r>
-              <a:rPr lang="en-US" sz="2400" b="1" dirty="0" smtClean="0"/>
-              <a:t>C</a:t>
+              <a:rPr lang="en-US" sz="2400" b="1" dirty="0"/>
+              <a:t>D</a:t>
             </a:r>
             <a:endParaRPr lang="en-US" sz="2400" b="1" dirty="0"/>
           </a:p>
@@ -3362,14 +3392,14 @@
       </p:sp>
       <p:pic>
         <p:nvPicPr>
-          <p:cNvPr id="2" name="Picture 1"/>
+          <p:cNvPr id="21" name="Picture 20"/>
           <p:cNvPicPr>
             <a:picLocks noChangeAspect="1"/>
           </p:cNvPicPr>
           <p:nvPr/>
         </p:nvPicPr>
         <p:blipFill>
-          <a:blip r:embed="rId2">
+          <a:blip r:embed="rId3">
             <a:extLst>
               <a:ext uri="{28A0092B-C50C-407E-A947-70E740481C1C}">
                 <a14:useLocalDpi xmlns:a14="http://schemas.microsoft.com/office/drawing/2010/main" val="0"/>
@@ -3392,37 +3422,7 @@
       </p:pic>
       <p:pic>
         <p:nvPicPr>
-          <p:cNvPr id="4" name="Picture 3"/>
-          <p:cNvPicPr>
-            <a:picLocks noChangeAspect="1"/>
-          </p:cNvPicPr>
-          <p:nvPr/>
-        </p:nvPicPr>
-        <p:blipFill>
-          <a:blip r:embed="rId3">
-            <a:extLst>
-              <a:ext uri="{28A0092B-C50C-407E-A947-70E740481C1C}">
-                <a14:useLocalDpi xmlns:a14="http://schemas.microsoft.com/office/drawing/2010/main" val="0"/>
-              </a:ext>
-            </a:extLst>
-          </a:blip>
-          <a:stretch>
-            <a:fillRect/>
-          </a:stretch>
-        </p:blipFill>
-        <p:spPr>
-          <a:xfrm>
-            <a:off x="5118134" y="369617"/>
-            <a:ext cx="5299167" cy="7300913"/>
-          </a:xfrm>
-          <a:prstGeom prst="rect">
-            <a:avLst/>
-          </a:prstGeom>
-        </p:spPr>
-      </p:pic>
-      <p:pic>
-        <p:nvPicPr>
-          <p:cNvPr id="8" name="Picture 7"/>
+          <p:cNvPr id="22" name="Picture 21"/>
           <p:cNvPicPr>
             <a:picLocks noChangeAspect="1"/>
           </p:cNvPicPr>
@@ -3442,14 +3442,127 @@
         </p:blipFill>
         <p:spPr>
           <a:xfrm>
-            <a:off x="9959390" y="0"/>
-            <a:ext cx="3756610" cy="7786688"/>
+            <a:off x="8819192" y="3141170"/>
+            <a:ext cx="3379333" cy="4655867"/>
           </a:xfrm>
           <a:prstGeom prst="rect">
             <a:avLst/>
           </a:prstGeom>
         </p:spPr>
       </p:pic>
+      <p:pic>
+        <p:nvPicPr>
+          <p:cNvPr id="3" name="Picture 2"/>
+          <p:cNvPicPr>
+            <a:picLocks noChangeAspect="1"/>
+          </p:cNvPicPr>
+          <p:nvPr/>
+        </p:nvPicPr>
+        <p:blipFill>
+          <a:blip r:embed="rId5">
+            <a:extLst>
+              <a:ext uri="{28A0092B-C50C-407E-A947-70E740481C1C}">
+                <a14:useLocalDpi xmlns:a14="http://schemas.microsoft.com/office/drawing/2010/main" val="0"/>
+              </a:ext>
+            </a:extLst>
+          </a:blip>
+          <a:stretch>
+            <a:fillRect/>
+          </a:stretch>
+        </p:blipFill>
+        <p:spPr>
+          <a:xfrm>
+            <a:off x="3175254" y="399205"/>
+            <a:ext cx="8272292" cy="6965269"/>
+          </a:xfrm>
+          <a:prstGeom prst="rect">
+            <a:avLst/>
+          </a:prstGeom>
+        </p:spPr>
+      </p:pic>
+      <p:sp>
+        <p:nvSpPr>
+          <p:cNvPr id="24" name="Rectangle 23"/>
+          <p:cNvSpPr/>
+          <p:nvPr/>
+        </p:nvSpPr>
+        <p:spPr>
+          <a:xfrm>
+            <a:off x="4823091" y="7573705"/>
+            <a:ext cx="3352800" cy="584775"/>
+          </a:xfrm>
+          <a:prstGeom prst="rect">
+            <a:avLst/>
+          </a:prstGeom>
+        </p:spPr>
+        <p:txBody>
+          <a:bodyPr wrap="square">
+            <a:spAutoFit/>
+          </a:bodyPr>
+          <a:lstStyle/>
+          <a:p>
+            <a:pPr algn="ctr"/>
+            <a:r>
+              <a:rPr lang="en-US" sz="1600" i="1" dirty="0" err="1"/>
+              <a:t>Burkholderia</a:t>
+            </a:r>
+            <a:r>
+              <a:rPr lang="en-US" sz="1600" i="1" dirty="0"/>
+              <a:t> </a:t>
+            </a:r>
+            <a:r>
+              <a:rPr lang="en-US" sz="1600" i="1" dirty="0" err="1"/>
+              <a:t>pseudomallei</a:t>
+            </a:r>
+            <a:r>
+              <a:rPr lang="en-US" sz="1600" i="1" dirty="0"/>
+              <a:t> </a:t>
+            </a:r>
+            <a:r>
+              <a:rPr lang="en-US" sz="1600" i="1" dirty="0" smtClean="0"/>
+              <a:t>K96243</a:t>
+            </a:r>
+          </a:p>
+          <a:p>
+            <a:pPr algn="ctr"/>
+            <a:r>
+              <a:rPr lang="is-IS" sz="1600" dirty="0" smtClean="0"/>
+              <a:t>NC_006350.1:2082167-2082000(-)</a:t>
+            </a:r>
+            <a:endParaRPr lang="en-US" sz="1600" dirty="0"/>
+          </a:p>
+        </p:txBody>
+      </p:sp>
+      <p:sp>
+        <p:nvSpPr>
+          <p:cNvPr id="25" name="Rectangle 24"/>
+          <p:cNvSpPr/>
+          <p:nvPr/>
+        </p:nvSpPr>
+        <p:spPr>
+          <a:xfrm>
+            <a:off x="9592571" y="3881839"/>
+            <a:ext cx="481757" cy="461665"/>
+          </a:xfrm>
+          <a:prstGeom prst="rect">
+            <a:avLst/>
+          </a:prstGeom>
+        </p:spPr>
+        <p:txBody>
+          <a:bodyPr wrap="square">
+            <a:spAutoFit/>
+          </a:bodyPr>
+          <a:lstStyle/>
+          <a:p>
+            <a:pPr algn="ctr"/>
+            <a:r>
+              <a:rPr lang="en-US" sz="2400" b="1" dirty="0" smtClean="0"/>
+              <a:t>C</a:t>
+            </a:r>
+            <a:endParaRPr lang="en-US" sz="2400" b="1" dirty="0"/>
+          </a:p>
+        </p:txBody>
+      </p:sp>
     </p:spTree>
     <p:extLst>
       <p:ext uri="{BB962C8B-B14F-4D97-AF65-F5344CB8AC3E}">

</xml_diff>

<commit_message>
Color => Grayscale images
</commit_message>
<xml_diff>
--- a/images/rnafold_Proteobacteria.pptx
+++ b/images/rnafold_Proteobacteria.pptx
@@ -304,7 +304,7 @@
           <a:p>
             <a:fld id="{01197F44-DB72-474A-9754-31703E05C006}" type="datetimeFigureOut">
               <a:rPr lang="en-US" smtClean="0"/>
-              <a:t>11/23/19</a:t>
+              <a:t>11/25/19</a:t>
             </a:fld>
             <a:endParaRPr lang="en-US"/>
           </a:p>
@@ -474,7 +474,7 @@
           <a:p>
             <a:fld id="{01197F44-DB72-474A-9754-31703E05C006}" type="datetimeFigureOut">
               <a:rPr lang="en-US" smtClean="0"/>
-              <a:t>11/23/19</a:t>
+              <a:t>11/25/19</a:t>
             </a:fld>
             <a:endParaRPr lang="en-US"/>
           </a:p>
@@ -654,7 +654,7 @@
           <a:p>
             <a:fld id="{01197F44-DB72-474A-9754-31703E05C006}" type="datetimeFigureOut">
               <a:rPr lang="en-US" smtClean="0"/>
-              <a:t>11/23/19</a:t>
+              <a:t>11/25/19</a:t>
             </a:fld>
             <a:endParaRPr lang="en-US"/>
           </a:p>
@@ -824,7 +824,7 @@
           <a:p>
             <a:fld id="{01197F44-DB72-474A-9754-31703E05C006}" type="datetimeFigureOut">
               <a:rPr lang="en-US" smtClean="0"/>
-              <a:t>11/23/19</a:t>
+              <a:t>11/25/19</a:t>
             </a:fld>
             <a:endParaRPr lang="en-US"/>
           </a:p>
@@ -1070,7 +1070,7 @@
           <a:p>
             <a:fld id="{01197F44-DB72-474A-9754-31703E05C006}" type="datetimeFigureOut">
               <a:rPr lang="en-US" smtClean="0"/>
-              <a:t>11/23/19</a:t>
+              <a:t>11/25/19</a:t>
             </a:fld>
             <a:endParaRPr lang="en-US"/>
           </a:p>
@@ -1358,7 +1358,7 @@
           <a:p>
             <a:fld id="{01197F44-DB72-474A-9754-31703E05C006}" type="datetimeFigureOut">
               <a:rPr lang="en-US" smtClean="0"/>
-              <a:t>11/23/19</a:t>
+              <a:t>11/25/19</a:t>
             </a:fld>
             <a:endParaRPr lang="en-US"/>
           </a:p>
@@ -1780,7 +1780,7 @@
           <a:p>
             <a:fld id="{01197F44-DB72-474A-9754-31703E05C006}" type="datetimeFigureOut">
               <a:rPr lang="en-US" smtClean="0"/>
-              <a:t>11/23/19</a:t>
+              <a:t>11/25/19</a:t>
             </a:fld>
             <a:endParaRPr lang="en-US"/>
           </a:p>
@@ -1898,7 +1898,7 @@
           <a:p>
             <a:fld id="{01197F44-DB72-474A-9754-31703E05C006}" type="datetimeFigureOut">
               <a:rPr lang="en-US" smtClean="0"/>
-              <a:t>11/23/19</a:t>
+              <a:t>11/25/19</a:t>
             </a:fld>
             <a:endParaRPr lang="en-US"/>
           </a:p>
@@ -1993,7 +1993,7 @@
           <a:p>
             <a:fld id="{01197F44-DB72-474A-9754-31703E05C006}" type="datetimeFigureOut">
               <a:rPr lang="en-US" smtClean="0"/>
-              <a:t>11/23/19</a:t>
+              <a:t>11/25/19</a:t>
             </a:fld>
             <a:endParaRPr lang="en-US"/>
           </a:p>
@@ -2270,7 +2270,7 @@
           <a:p>
             <a:fld id="{01197F44-DB72-474A-9754-31703E05C006}" type="datetimeFigureOut">
               <a:rPr lang="en-US" smtClean="0"/>
-              <a:t>11/23/19</a:t>
+              <a:t>11/25/19</a:t>
             </a:fld>
             <a:endParaRPr lang="en-US"/>
           </a:p>
@@ -2523,7 +2523,7 @@
           <a:p>
             <a:fld id="{01197F44-DB72-474A-9754-31703E05C006}" type="datetimeFigureOut">
               <a:rPr lang="en-US" smtClean="0"/>
-              <a:t>11/23/19</a:t>
+              <a:t>11/25/19</a:t>
             </a:fld>
             <a:endParaRPr lang="en-US"/>
           </a:p>
@@ -2736,7 +2736,7 @@
           <a:p>
             <a:fld id="{01197F44-DB72-474A-9754-31703E05C006}" type="datetimeFigureOut">
               <a:rPr lang="en-US" smtClean="0"/>
-              <a:t>11/23/19</a:t>
+              <a:t>11/25/19</a:t>
             </a:fld>
             <a:endParaRPr lang="en-US"/>
           </a:p>
@@ -3113,7 +3113,7 @@
       </p:grpSpPr>
       <p:pic>
         <p:nvPicPr>
-          <p:cNvPr id="23" name="Picture 22"/>
+          <p:cNvPr id="4" name="Picture 3"/>
           <p:cNvPicPr>
             <a:picLocks noChangeAspect="1"/>
           </p:cNvPicPr>
@@ -3133,8 +3133,8 @@
         </p:blipFill>
         <p:spPr>
           <a:xfrm>
-            <a:off x="12031806" y="291984"/>
-            <a:ext cx="3512994" cy="7281721"/>
+            <a:off x="2656579" y="0"/>
+            <a:ext cx="9903249" cy="8229600"/>
           </a:xfrm>
           <a:prstGeom prst="rect">
             <a:avLst/>
@@ -3337,9 +3337,62 @@
           </a:p>
         </p:txBody>
       </p:sp>
+      <p:sp>
+        <p:nvSpPr>
+          <p:cNvPr id="24" name="Rectangle 23"/>
+          <p:cNvSpPr/>
+          <p:nvPr/>
+        </p:nvSpPr>
+        <p:spPr>
+          <a:xfrm>
+            <a:off x="6636474" y="7573705"/>
+            <a:ext cx="4648294" cy="646331"/>
+          </a:xfrm>
+          <a:prstGeom prst="rect">
+            <a:avLst/>
+          </a:prstGeom>
+        </p:spPr>
+        <p:txBody>
+          <a:bodyPr wrap="square">
+            <a:spAutoFit/>
+          </a:bodyPr>
+          <a:lstStyle/>
+          <a:p>
+            <a:pPr algn="ctr"/>
+            <a:r>
+              <a:rPr lang="en-US" sz="1800" i="1" dirty="0" err="1"/>
+              <a:t>Burkholderia</a:t>
+            </a:r>
+            <a:r>
+              <a:rPr lang="en-US" sz="1800" i="1" dirty="0"/>
+              <a:t> </a:t>
+            </a:r>
+            <a:r>
+              <a:rPr lang="en-US" sz="1800" i="1" dirty="0" err="1"/>
+              <a:t>pseudomallei</a:t>
+            </a:r>
+            <a:r>
+              <a:rPr lang="en-US" sz="1800" i="1" dirty="0"/>
+              <a:t> </a:t>
+            </a:r>
+            <a:r>
+              <a:rPr lang="en-US" sz="1800" i="1" dirty="0" smtClean="0"/>
+              <a:t>K96243</a:t>
+            </a:r>
+          </a:p>
+          <a:p>
+            <a:pPr algn="ctr"/>
+            <a:r>
+              <a:rPr lang="is-IS" sz="1800" dirty="0" smtClean="0"/>
+              <a:t>NC_006350.1:2082167-2082000(-)</a:t>
+            </a:r>
+            <a:endParaRPr lang="en-US" sz="1800" dirty="0"/>
+          </a:p>
+        </p:txBody>
+      </p:sp>
       <p:pic>
         <p:nvPicPr>
-          <p:cNvPr id="21" name="Picture 20"/>
+          <p:cNvPr id="2" name="Picture 1"/>
           <p:cNvPicPr>
             <a:picLocks noChangeAspect="1"/>
           </p:cNvPicPr>
@@ -3359,8 +3412,8 @@
         </p:blipFill>
         <p:spPr>
           <a:xfrm>
-            <a:off x="291971" y="0"/>
-            <a:ext cx="4612266" cy="8229600"/>
+            <a:off x="60154" y="0"/>
+            <a:ext cx="4628571" cy="8229600"/>
           </a:xfrm>
           <a:prstGeom prst="rect">
             <a:avLst/>
@@ -3369,7 +3422,7 @@
       </p:pic>
       <p:pic>
         <p:nvPicPr>
-          <p:cNvPr id="3" name="Picture 2"/>
+          <p:cNvPr id="5" name="Picture 4"/>
           <p:cNvPicPr>
             <a:picLocks noChangeAspect="1"/>
           </p:cNvPicPr>
@@ -3389,67 +3442,14 @@
         </p:blipFill>
         <p:spPr>
           <a:xfrm>
-            <a:off x="4144406" y="399205"/>
-            <a:ext cx="8272292" cy="6965269"/>
+            <a:off x="11848391" y="0"/>
+            <a:ext cx="3741949" cy="7573705"/>
           </a:xfrm>
           <a:prstGeom prst="rect">
             <a:avLst/>
           </a:prstGeom>
         </p:spPr>
       </p:pic>
-      <p:sp>
-        <p:nvSpPr>
-          <p:cNvPr id="24" name="Rectangle 23"/>
-          <p:cNvSpPr/>
-          <p:nvPr/>
-        </p:nvSpPr>
-        <p:spPr>
-          <a:xfrm>
-            <a:off x="5792243" y="7573705"/>
-            <a:ext cx="4648294" cy="646331"/>
-          </a:xfrm>
-          <a:prstGeom prst="rect">
-            <a:avLst/>
-          </a:prstGeom>
-        </p:spPr>
-        <p:txBody>
-          <a:bodyPr wrap="square">
-            <a:spAutoFit/>
-          </a:bodyPr>
-          <a:lstStyle/>
-          <a:p>
-            <a:pPr algn="ctr"/>
-            <a:r>
-              <a:rPr lang="en-US" sz="1800" i="1" dirty="0" err="1"/>
-              <a:t>Burkholderia</a:t>
-            </a:r>
-            <a:r>
-              <a:rPr lang="en-US" sz="1800" i="1" dirty="0"/>
-              <a:t> </a:t>
-            </a:r>
-            <a:r>
-              <a:rPr lang="en-US" sz="1800" i="1" dirty="0" err="1"/>
-              <a:t>pseudomallei</a:t>
-            </a:r>
-            <a:r>
-              <a:rPr lang="en-US" sz="1800" i="1" dirty="0"/>
-              <a:t> </a:t>
-            </a:r>
-            <a:r>
-              <a:rPr lang="en-US" sz="1800" i="1" dirty="0" smtClean="0"/>
-              <a:t>K96243</a:t>
-            </a:r>
-          </a:p>
-          <a:p>
-            <a:pPr algn="ctr"/>
-            <a:r>
-              <a:rPr lang="is-IS" sz="1800" dirty="0" smtClean="0"/>
-              <a:t>NC_006350.1:2082167-2082000(-)</a:t>
-            </a:r>
-            <a:endParaRPr lang="en-US" sz="1800" dirty="0"/>
-          </a:p>
-        </p:txBody>
-      </p:sp>
     </p:spTree>
     <p:extLst>
       <p:ext uri="{BB962C8B-B14F-4D97-AF65-F5344CB8AC3E}">

</xml_diff>

<commit_message>
"Marinomonas posidonica"  =>  "Marinomonas posidonica IVIA-Po-181"
</commit_message>
<xml_diff>
--- a/images/rnafold_Proteobacteria.pptx
+++ b/images/rnafold_Proteobacteria.pptx
@@ -304,7 +304,7 @@
           <a:p>
             <a:fld id="{01197F44-DB72-474A-9754-31703E05C006}" type="datetimeFigureOut">
               <a:rPr lang="en-US" smtClean="0"/>
-              <a:t>11/25/19</a:t>
+              <a:t>3/15/20</a:t>
             </a:fld>
             <a:endParaRPr lang="en-US"/>
           </a:p>
@@ -474,7 +474,7 @@
           <a:p>
             <a:fld id="{01197F44-DB72-474A-9754-31703E05C006}" type="datetimeFigureOut">
               <a:rPr lang="en-US" smtClean="0"/>
-              <a:t>11/25/19</a:t>
+              <a:t>3/15/20</a:t>
             </a:fld>
             <a:endParaRPr lang="en-US"/>
           </a:p>
@@ -654,7 +654,7 @@
           <a:p>
             <a:fld id="{01197F44-DB72-474A-9754-31703E05C006}" type="datetimeFigureOut">
               <a:rPr lang="en-US" smtClean="0"/>
-              <a:t>11/25/19</a:t>
+              <a:t>3/15/20</a:t>
             </a:fld>
             <a:endParaRPr lang="en-US"/>
           </a:p>
@@ -824,7 +824,7 @@
           <a:p>
             <a:fld id="{01197F44-DB72-474A-9754-31703E05C006}" type="datetimeFigureOut">
               <a:rPr lang="en-US" smtClean="0"/>
-              <a:t>11/25/19</a:t>
+              <a:t>3/15/20</a:t>
             </a:fld>
             <a:endParaRPr lang="en-US"/>
           </a:p>
@@ -1070,7 +1070,7 @@
           <a:p>
             <a:fld id="{01197F44-DB72-474A-9754-31703E05C006}" type="datetimeFigureOut">
               <a:rPr lang="en-US" smtClean="0"/>
-              <a:t>11/25/19</a:t>
+              <a:t>3/15/20</a:t>
             </a:fld>
             <a:endParaRPr lang="en-US"/>
           </a:p>
@@ -1358,7 +1358,7 @@
           <a:p>
             <a:fld id="{01197F44-DB72-474A-9754-31703E05C006}" type="datetimeFigureOut">
               <a:rPr lang="en-US" smtClean="0"/>
-              <a:t>11/25/19</a:t>
+              <a:t>3/15/20</a:t>
             </a:fld>
             <a:endParaRPr lang="en-US"/>
           </a:p>
@@ -1780,7 +1780,7 @@
           <a:p>
             <a:fld id="{01197F44-DB72-474A-9754-31703E05C006}" type="datetimeFigureOut">
               <a:rPr lang="en-US" smtClean="0"/>
-              <a:t>11/25/19</a:t>
+              <a:t>3/15/20</a:t>
             </a:fld>
             <a:endParaRPr lang="en-US"/>
           </a:p>
@@ -1898,7 +1898,7 @@
           <a:p>
             <a:fld id="{01197F44-DB72-474A-9754-31703E05C006}" type="datetimeFigureOut">
               <a:rPr lang="en-US" smtClean="0"/>
-              <a:t>11/25/19</a:t>
+              <a:t>3/15/20</a:t>
             </a:fld>
             <a:endParaRPr lang="en-US"/>
           </a:p>
@@ -1993,7 +1993,7 @@
           <a:p>
             <a:fld id="{01197F44-DB72-474A-9754-31703E05C006}" type="datetimeFigureOut">
               <a:rPr lang="en-US" smtClean="0"/>
-              <a:t>11/25/19</a:t>
+              <a:t>3/15/20</a:t>
             </a:fld>
             <a:endParaRPr lang="en-US"/>
           </a:p>
@@ -2270,7 +2270,7 @@
           <a:p>
             <a:fld id="{01197F44-DB72-474A-9754-31703E05C006}" type="datetimeFigureOut">
               <a:rPr lang="en-US" smtClean="0"/>
-              <a:t>11/25/19</a:t>
+              <a:t>3/15/20</a:t>
             </a:fld>
             <a:endParaRPr lang="en-US"/>
           </a:p>
@@ -2523,7 +2523,7 @@
           <a:p>
             <a:fld id="{01197F44-DB72-474A-9754-31703E05C006}" type="datetimeFigureOut">
               <a:rPr lang="en-US" smtClean="0"/>
-              <a:t>11/25/19</a:t>
+              <a:t>3/15/20</a:t>
             </a:fld>
             <a:endParaRPr lang="en-US"/>
           </a:p>
@@ -2736,7 +2736,7 @@
           <a:p>
             <a:fld id="{01197F44-DB72-474A-9754-31703E05C006}" type="datetimeFigureOut">
               <a:rPr lang="en-US" smtClean="0"/>
-              <a:t>11/25/19</a:t>
+              <a:t>3/15/20</a:t>
             </a:fld>
             <a:endParaRPr lang="en-US"/>
           </a:p>
@@ -3149,8 +3149,8 @@
         </p:nvSpPr>
         <p:spPr>
           <a:xfrm>
-            <a:off x="11844336" y="7589005"/>
-            <a:ext cx="3227191" cy="646331"/>
+            <a:off x="11284768" y="7589005"/>
+            <a:ext cx="3786759" cy="646331"/>
           </a:xfrm>
           <a:prstGeom prst="rect">
             <a:avLst/>
@@ -3172,8 +3172,16 @@
               <a:t> </a:t>
             </a:r>
             <a:r>
-              <a:rPr lang="en-US" sz="1800" i="1" dirty="0" err="1" smtClean="0"/>
+              <a:rPr lang="en-US" sz="1800" i="1" dirty="0" err="1"/>
               <a:t>posidonica</a:t>
+            </a:r>
+            <a:r>
+              <a:rPr lang="en-US" sz="1800" i="1" dirty="0"/>
+              <a:t> </a:t>
+            </a:r>
+            <a:r>
+              <a:rPr lang="en-US" sz="1800" i="1" dirty="0" smtClean="0"/>
+              <a:t>IVIA-Po-181</a:t>
             </a:r>
             <a:endParaRPr lang="en-US" sz="1800" i="1" dirty="0" smtClean="0"/>
           </a:p>

</xml_diff>

<commit_message>
Back to the color images
</commit_message>
<xml_diff>
--- a/images/rnafold_Proteobacteria.pptx
+++ b/images/rnafold_Proteobacteria.pptx
@@ -304,7 +304,7 @@
           <a:p>
             <a:fld id="{01197F44-DB72-474A-9754-31703E05C006}" type="datetimeFigureOut">
               <a:rPr lang="en-US" smtClean="0"/>
-              <a:t>3/15/20</a:t>
+              <a:t>4/10/20</a:t>
             </a:fld>
             <a:endParaRPr lang="en-US"/>
           </a:p>
@@ -474,7 +474,7 @@
           <a:p>
             <a:fld id="{01197F44-DB72-474A-9754-31703E05C006}" type="datetimeFigureOut">
               <a:rPr lang="en-US" smtClean="0"/>
-              <a:t>3/15/20</a:t>
+              <a:t>4/10/20</a:t>
             </a:fld>
             <a:endParaRPr lang="en-US"/>
           </a:p>
@@ -654,7 +654,7 @@
           <a:p>
             <a:fld id="{01197F44-DB72-474A-9754-31703E05C006}" type="datetimeFigureOut">
               <a:rPr lang="en-US" smtClean="0"/>
-              <a:t>3/15/20</a:t>
+              <a:t>4/10/20</a:t>
             </a:fld>
             <a:endParaRPr lang="en-US"/>
           </a:p>
@@ -824,7 +824,7 @@
           <a:p>
             <a:fld id="{01197F44-DB72-474A-9754-31703E05C006}" type="datetimeFigureOut">
               <a:rPr lang="en-US" smtClean="0"/>
-              <a:t>3/15/20</a:t>
+              <a:t>4/10/20</a:t>
             </a:fld>
             <a:endParaRPr lang="en-US"/>
           </a:p>
@@ -1070,7 +1070,7 @@
           <a:p>
             <a:fld id="{01197F44-DB72-474A-9754-31703E05C006}" type="datetimeFigureOut">
               <a:rPr lang="en-US" smtClean="0"/>
-              <a:t>3/15/20</a:t>
+              <a:t>4/10/20</a:t>
             </a:fld>
             <a:endParaRPr lang="en-US"/>
           </a:p>
@@ -1358,7 +1358,7 @@
           <a:p>
             <a:fld id="{01197F44-DB72-474A-9754-31703E05C006}" type="datetimeFigureOut">
               <a:rPr lang="en-US" smtClean="0"/>
-              <a:t>3/15/20</a:t>
+              <a:t>4/10/20</a:t>
             </a:fld>
             <a:endParaRPr lang="en-US"/>
           </a:p>
@@ -1780,7 +1780,7 @@
           <a:p>
             <a:fld id="{01197F44-DB72-474A-9754-31703E05C006}" type="datetimeFigureOut">
               <a:rPr lang="en-US" smtClean="0"/>
-              <a:t>3/15/20</a:t>
+              <a:t>4/10/20</a:t>
             </a:fld>
             <a:endParaRPr lang="en-US"/>
           </a:p>
@@ -1898,7 +1898,7 @@
           <a:p>
             <a:fld id="{01197F44-DB72-474A-9754-31703E05C006}" type="datetimeFigureOut">
               <a:rPr lang="en-US" smtClean="0"/>
-              <a:t>3/15/20</a:t>
+              <a:t>4/10/20</a:t>
             </a:fld>
             <a:endParaRPr lang="en-US"/>
           </a:p>
@@ -1993,7 +1993,7 @@
           <a:p>
             <a:fld id="{01197F44-DB72-474A-9754-31703E05C006}" type="datetimeFigureOut">
               <a:rPr lang="en-US" smtClean="0"/>
-              <a:t>3/15/20</a:t>
+              <a:t>4/10/20</a:t>
             </a:fld>
             <a:endParaRPr lang="en-US"/>
           </a:p>
@@ -2270,7 +2270,7 @@
           <a:p>
             <a:fld id="{01197F44-DB72-474A-9754-31703E05C006}" type="datetimeFigureOut">
               <a:rPr lang="en-US" smtClean="0"/>
-              <a:t>3/15/20</a:t>
+              <a:t>4/10/20</a:t>
             </a:fld>
             <a:endParaRPr lang="en-US"/>
           </a:p>
@@ -2523,7 +2523,7 @@
           <a:p>
             <a:fld id="{01197F44-DB72-474A-9754-31703E05C006}" type="datetimeFigureOut">
               <a:rPr lang="en-US" smtClean="0"/>
-              <a:t>3/15/20</a:t>
+              <a:t>4/10/20</a:t>
             </a:fld>
             <a:endParaRPr lang="en-US"/>
           </a:p>
@@ -2736,7 +2736,7 @@
           <a:p>
             <a:fld id="{01197F44-DB72-474A-9754-31703E05C006}" type="datetimeFigureOut">
               <a:rPr lang="en-US" smtClean="0"/>
-              <a:t>3/15/20</a:t>
+              <a:t>4/10/20</a:t>
             </a:fld>
             <a:endParaRPr lang="en-US"/>
           </a:p>
@@ -3111,9 +3111,265 @@
           <a:chExt cx="0" cy="0"/>
         </a:xfrm>
       </p:grpSpPr>
+      <p:sp>
+        <p:nvSpPr>
+          <p:cNvPr id="11" name="Rectangle 10"/>
+          <p:cNvSpPr/>
+          <p:nvPr/>
+        </p:nvSpPr>
+        <p:spPr>
+          <a:xfrm>
+            <a:off x="11284768" y="7589005"/>
+            <a:ext cx="3786759" cy="646331"/>
+          </a:xfrm>
+          <a:prstGeom prst="rect">
+            <a:avLst/>
+          </a:prstGeom>
+        </p:spPr>
+        <p:txBody>
+          <a:bodyPr wrap="square">
+            <a:spAutoFit/>
+          </a:bodyPr>
+          <a:lstStyle/>
+          <a:p>
+            <a:pPr algn="ctr"/>
+            <a:r>
+              <a:rPr lang="en-US" sz="1800" i="1" dirty="0" err="1"/>
+              <a:t>Marinomonas</a:t>
+            </a:r>
+            <a:r>
+              <a:rPr lang="en-US" sz="1800" i="1" dirty="0"/>
+              <a:t> </a:t>
+            </a:r>
+            <a:r>
+              <a:rPr lang="en-US" sz="1800" i="1" dirty="0" err="1"/>
+              <a:t>posidonica</a:t>
+            </a:r>
+            <a:r>
+              <a:rPr lang="en-US" sz="1800" i="1" dirty="0"/>
+              <a:t> </a:t>
+            </a:r>
+            <a:r>
+              <a:rPr lang="en-US" sz="1800" i="1" dirty="0" smtClean="0"/>
+              <a:t>IVIA-Po-181</a:t>
+            </a:r>
+          </a:p>
+          <a:p>
+            <a:pPr algn="ctr"/>
+            <a:r>
+              <a:rPr lang="mr-IN" sz="1800" dirty="0">
+                <a:cs typeface="Courier New"/>
+              </a:rPr>
+              <a:t>NC_015559.1:957765-957890</a:t>
+            </a:r>
+            <a:r>
+              <a:rPr lang="cs-CZ" sz="1800" dirty="0" smtClean="0">
+                <a:cs typeface="Courier New"/>
+              </a:rPr>
+              <a:t>(+)</a:t>
+            </a:r>
+            <a:endParaRPr lang="en-US" sz="1800" i="1" dirty="0"/>
+          </a:p>
+        </p:txBody>
+      </p:sp>
+      <p:sp>
+        <p:nvSpPr>
+          <p:cNvPr id="15" name="Rectangle 14"/>
+          <p:cNvSpPr/>
+          <p:nvPr/>
+        </p:nvSpPr>
+        <p:spPr>
+          <a:xfrm>
+            <a:off x="666690" y="168748"/>
+            <a:ext cx="589688" cy="461665"/>
+          </a:xfrm>
+          <a:prstGeom prst="rect">
+            <a:avLst/>
+          </a:prstGeom>
+        </p:spPr>
+        <p:txBody>
+          <a:bodyPr wrap="square">
+            <a:spAutoFit/>
+          </a:bodyPr>
+          <a:lstStyle/>
+          <a:p>
+            <a:pPr algn="ctr"/>
+            <a:r>
+              <a:rPr lang="en-US" sz="2400" b="1" dirty="0" smtClean="0"/>
+              <a:t>A</a:t>
+            </a:r>
+            <a:endParaRPr lang="en-US" sz="2400" b="1" dirty="0"/>
+          </a:p>
+        </p:txBody>
+      </p:sp>
+      <p:sp>
+        <p:nvSpPr>
+          <p:cNvPr id="17" name="Rectangle 16"/>
+          <p:cNvSpPr/>
+          <p:nvPr/>
+        </p:nvSpPr>
+        <p:spPr>
+          <a:xfrm>
+            <a:off x="4609178" y="168373"/>
+            <a:ext cx="503573" cy="461665"/>
+          </a:xfrm>
+          <a:prstGeom prst="rect">
+            <a:avLst/>
+          </a:prstGeom>
+        </p:spPr>
+        <p:txBody>
+          <a:bodyPr wrap="square">
+            <a:spAutoFit/>
+          </a:bodyPr>
+          <a:lstStyle/>
+          <a:p>
+            <a:pPr algn="ctr"/>
+            <a:r>
+              <a:rPr lang="en-US" sz="2400" b="1" dirty="0"/>
+              <a:t>B</a:t>
+            </a:r>
+          </a:p>
+        </p:txBody>
+      </p:sp>
+      <p:sp>
+        <p:nvSpPr>
+          <p:cNvPr id="18" name="Rectangle 17"/>
+          <p:cNvSpPr/>
+          <p:nvPr/>
+        </p:nvSpPr>
+        <p:spPr>
+          <a:xfrm>
+            <a:off x="1256378" y="7573705"/>
+            <a:ext cx="3752350" cy="646331"/>
+          </a:xfrm>
+          <a:prstGeom prst="rect">
+            <a:avLst/>
+          </a:prstGeom>
+        </p:spPr>
+        <p:txBody>
+          <a:bodyPr wrap="square">
+            <a:spAutoFit/>
+          </a:bodyPr>
+          <a:lstStyle/>
+          <a:p>
+            <a:pPr algn="ctr"/>
+            <a:r>
+              <a:rPr lang="en-US" sz="1800" i="1" dirty="0" err="1"/>
+              <a:t>Delftia</a:t>
+            </a:r>
+            <a:r>
+              <a:rPr lang="en-US" sz="1800" i="1" dirty="0"/>
+              <a:t> </a:t>
+            </a:r>
+            <a:r>
+              <a:rPr lang="en-US" sz="1800" i="1" dirty="0" err="1"/>
+              <a:t>acidovorans</a:t>
+            </a:r>
+            <a:r>
+              <a:rPr lang="en-US" sz="1800" i="1" dirty="0"/>
+              <a:t> </a:t>
+            </a:r>
+            <a:r>
+              <a:rPr lang="en-US" sz="1800" i="1" dirty="0" smtClean="0"/>
+              <a:t>SPH-1</a:t>
+            </a:r>
+          </a:p>
+          <a:p>
+            <a:pPr algn="ctr"/>
+            <a:r>
+              <a:rPr lang="is-IS" sz="1800" dirty="0" smtClean="0"/>
+              <a:t>NC_010002.1:6395600-6395711(-)</a:t>
+            </a:r>
+            <a:endParaRPr lang="en-US" sz="1800" dirty="0"/>
+          </a:p>
+        </p:txBody>
+      </p:sp>
+      <p:sp>
+        <p:nvSpPr>
+          <p:cNvPr id="20" name="Rectangle 19"/>
+          <p:cNvSpPr/>
+          <p:nvPr/>
+        </p:nvSpPr>
+        <p:spPr>
+          <a:xfrm>
+            <a:off x="12198525" y="168373"/>
+            <a:ext cx="481757" cy="461665"/>
+          </a:xfrm>
+          <a:prstGeom prst="rect">
+            <a:avLst/>
+          </a:prstGeom>
+        </p:spPr>
+        <p:txBody>
+          <a:bodyPr wrap="square">
+            <a:spAutoFit/>
+          </a:bodyPr>
+          <a:lstStyle/>
+          <a:p>
+            <a:pPr algn="ctr"/>
+            <a:r>
+              <a:rPr lang="en-US" sz="2400" b="1" dirty="0" smtClean="0"/>
+              <a:t>C</a:t>
+            </a:r>
+            <a:endParaRPr lang="en-US" sz="2400" b="1" dirty="0"/>
+          </a:p>
+        </p:txBody>
+      </p:sp>
+      <p:sp>
+        <p:nvSpPr>
+          <p:cNvPr id="24" name="Rectangle 23"/>
+          <p:cNvSpPr/>
+          <p:nvPr/>
+        </p:nvSpPr>
+        <p:spPr>
+          <a:xfrm>
+            <a:off x="6636474" y="7573705"/>
+            <a:ext cx="4648294" cy="646331"/>
+          </a:xfrm>
+          <a:prstGeom prst="rect">
+            <a:avLst/>
+          </a:prstGeom>
+        </p:spPr>
+        <p:txBody>
+          <a:bodyPr wrap="square">
+            <a:spAutoFit/>
+          </a:bodyPr>
+          <a:lstStyle/>
+          <a:p>
+            <a:pPr algn="ctr"/>
+            <a:r>
+              <a:rPr lang="en-US" sz="1800" i="1" dirty="0" err="1"/>
+              <a:t>Burkholderia</a:t>
+            </a:r>
+            <a:r>
+              <a:rPr lang="en-US" sz="1800" i="1" dirty="0"/>
+              <a:t> </a:t>
+            </a:r>
+            <a:r>
+              <a:rPr lang="en-US" sz="1800" i="1" dirty="0" err="1"/>
+              <a:t>pseudomallei</a:t>
+            </a:r>
+            <a:r>
+              <a:rPr lang="en-US" sz="1800" i="1" dirty="0"/>
+              <a:t> </a:t>
+            </a:r>
+            <a:r>
+              <a:rPr lang="en-US" sz="1800" i="1" dirty="0" smtClean="0"/>
+              <a:t>K96243</a:t>
+            </a:r>
+          </a:p>
+          <a:p>
+            <a:pPr algn="ctr"/>
+            <a:r>
+              <a:rPr lang="is-IS" sz="1800" dirty="0" smtClean="0"/>
+              <a:t>NC_006350.1:2082167-2082000(-)</a:t>
+            </a:r>
+            <a:endParaRPr lang="en-US" sz="1800" dirty="0"/>
+          </a:p>
+        </p:txBody>
+      </p:sp>
       <p:pic>
         <p:nvPicPr>
-          <p:cNvPr id="4" name="Picture 3"/>
+          <p:cNvPr id="2" name="Picture 1"/>
           <p:cNvPicPr>
             <a:picLocks noChangeAspect="1"/>
           </p:cNvPicPr>
@@ -3133,274 +3389,17 @@
         </p:blipFill>
         <p:spPr>
           <a:xfrm>
-            <a:off x="2656579" y="0"/>
-            <a:ext cx="9903249" cy="8229600"/>
+            <a:off x="20319" y="0"/>
+            <a:ext cx="4600112" cy="8229600"/>
           </a:xfrm>
           <a:prstGeom prst="rect">
             <a:avLst/>
           </a:prstGeom>
         </p:spPr>
       </p:pic>
-      <p:sp>
-        <p:nvSpPr>
-          <p:cNvPr id="11" name="Rectangle 10"/>
-          <p:cNvSpPr/>
-          <p:nvPr/>
-        </p:nvSpPr>
-        <p:spPr>
-          <a:xfrm>
-            <a:off x="11284768" y="7589005"/>
-            <a:ext cx="3786759" cy="646331"/>
-          </a:xfrm>
-          <a:prstGeom prst="rect">
-            <a:avLst/>
-          </a:prstGeom>
-        </p:spPr>
-        <p:txBody>
-          <a:bodyPr wrap="square">
-            <a:spAutoFit/>
-          </a:bodyPr>
-          <a:lstStyle/>
-          <a:p>
-            <a:pPr algn="ctr"/>
-            <a:r>
-              <a:rPr lang="en-US" sz="1800" i="1" dirty="0" err="1"/>
-              <a:t>Marinomonas</a:t>
-            </a:r>
-            <a:r>
-              <a:rPr lang="en-US" sz="1800" i="1" dirty="0"/>
-              <a:t> </a:t>
-            </a:r>
-            <a:r>
-              <a:rPr lang="en-US" sz="1800" i="1" dirty="0" err="1"/>
-              <a:t>posidonica</a:t>
-            </a:r>
-            <a:r>
-              <a:rPr lang="en-US" sz="1800" i="1" dirty="0"/>
-              <a:t> </a:t>
-            </a:r>
-            <a:r>
-              <a:rPr lang="en-US" sz="1800" i="1" dirty="0" smtClean="0"/>
-              <a:t>IVIA-Po-181</a:t>
-            </a:r>
-            <a:endParaRPr lang="en-US" sz="1800" i="1" dirty="0" smtClean="0"/>
-          </a:p>
-          <a:p>
-            <a:pPr algn="ctr"/>
-            <a:r>
-              <a:rPr lang="mr-IN" sz="1800" dirty="0">
-                <a:cs typeface="Courier New"/>
-              </a:rPr>
-              <a:t>NC_015559.1:957765-957890</a:t>
-            </a:r>
-            <a:r>
-              <a:rPr lang="cs-CZ" sz="1800" dirty="0" smtClean="0">
-                <a:cs typeface="Courier New"/>
-              </a:rPr>
-              <a:t>(+)</a:t>
-            </a:r>
-            <a:endParaRPr lang="en-US" sz="1800" i="1" dirty="0"/>
-          </a:p>
-        </p:txBody>
-      </p:sp>
-      <p:sp>
-        <p:nvSpPr>
-          <p:cNvPr id="15" name="Rectangle 14"/>
-          <p:cNvSpPr/>
-          <p:nvPr/>
-        </p:nvSpPr>
-        <p:spPr>
-          <a:xfrm>
-            <a:off x="666690" y="168748"/>
-            <a:ext cx="589688" cy="461665"/>
-          </a:xfrm>
-          <a:prstGeom prst="rect">
-            <a:avLst/>
-          </a:prstGeom>
-        </p:spPr>
-        <p:txBody>
-          <a:bodyPr wrap="square">
-            <a:spAutoFit/>
-          </a:bodyPr>
-          <a:lstStyle/>
-          <a:p>
-            <a:pPr algn="ctr"/>
-            <a:r>
-              <a:rPr lang="en-US" sz="2400" b="1" dirty="0" smtClean="0"/>
-              <a:t>A</a:t>
-            </a:r>
-            <a:endParaRPr lang="en-US" sz="2400" b="1" dirty="0"/>
-          </a:p>
-        </p:txBody>
-      </p:sp>
-      <p:sp>
-        <p:nvSpPr>
-          <p:cNvPr id="17" name="Rectangle 16"/>
-          <p:cNvSpPr/>
-          <p:nvPr/>
-        </p:nvSpPr>
-        <p:spPr>
-          <a:xfrm>
-            <a:off x="4609178" y="168373"/>
-            <a:ext cx="503573" cy="461665"/>
-          </a:xfrm>
-          <a:prstGeom prst="rect">
-            <a:avLst/>
-          </a:prstGeom>
-        </p:spPr>
-        <p:txBody>
-          <a:bodyPr wrap="square">
-            <a:spAutoFit/>
-          </a:bodyPr>
-          <a:lstStyle/>
-          <a:p>
-            <a:pPr algn="ctr"/>
-            <a:r>
-              <a:rPr lang="en-US" sz="2400" b="1" dirty="0"/>
-              <a:t>B</a:t>
-            </a:r>
-          </a:p>
-        </p:txBody>
-      </p:sp>
-      <p:sp>
-        <p:nvSpPr>
-          <p:cNvPr id="18" name="Rectangle 17"/>
-          <p:cNvSpPr/>
-          <p:nvPr/>
-        </p:nvSpPr>
-        <p:spPr>
-          <a:xfrm>
-            <a:off x="1256378" y="7573705"/>
-            <a:ext cx="3752350" cy="646331"/>
-          </a:xfrm>
-          <a:prstGeom prst="rect">
-            <a:avLst/>
-          </a:prstGeom>
-        </p:spPr>
-        <p:txBody>
-          <a:bodyPr wrap="square">
-            <a:spAutoFit/>
-          </a:bodyPr>
-          <a:lstStyle/>
-          <a:p>
-            <a:pPr algn="ctr"/>
-            <a:r>
-              <a:rPr lang="en-US" sz="1800" i="1" dirty="0" err="1"/>
-              <a:t>Delftia</a:t>
-            </a:r>
-            <a:r>
-              <a:rPr lang="en-US" sz="1800" i="1" dirty="0"/>
-              <a:t> </a:t>
-            </a:r>
-            <a:r>
-              <a:rPr lang="en-US" sz="1800" i="1" dirty="0" err="1"/>
-              <a:t>acidovorans</a:t>
-            </a:r>
-            <a:r>
-              <a:rPr lang="en-US" sz="1800" i="1" dirty="0"/>
-              <a:t> </a:t>
-            </a:r>
-            <a:r>
-              <a:rPr lang="en-US" sz="1800" i="1" dirty="0" smtClean="0"/>
-              <a:t>SPH-1</a:t>
-            </a:r>
-          </a:p>
-          <a:p>
-            <a:pPr algn="ctr"/>
-            <a:r>
-              <a:rPr lang="is-IS" sz="1800" dirty="0" smtClean="0"/>
-              <a:t>NC_010002.1:6395600-6395711(-)</a:t>
-            </a:r>
-            <a:endParaRPr lang="en-US" sz="1800" dirty="0"/>
-          </a:p>
-        </p:txBody>
-      </p:sp>
-      <p:sp>
-        <p:nvSpPr>
-          <p:cNvPr id="20" name="Rectangle 19"/>
-          <p:cNvSpPr/>
-          <p:nvPr/>
-        </p:nvSpPr>
-        <p:spPr>
-          <a:xfrm>
-            <a:off x="12198525" y="168373"/>
-            <a:ext cx="481757" cy="461665"/>
-          </a:xfrm>
-          <a:prstGeom prst="rect">
-            <a:avLst/>
-          </a:prstGeom>
-        </p:spPr>
-        <p:txBody>
-          <a:bodyPr wrap="square">
-            <a:spAutoFit/>
-          </a:bodyPr>
-          <a:lstStyle/>
-          <a:p>
-            <a:pPr algn="ctr"/>
-            <a:r>
-              <a:rPr lang="en-US" sz="2400" b="1" dirty="0" smtClean="0"/>
-              <a:t>C</a:t>
-            </a:r>
-            <a:endParaRPr lang="en-US" sz="2400" b="1" dirty="0"/>
-          </a:p>
-        </p:txBody>
-      </p:sp>
-      <p:sp>
-        <p:nvSpPr>
-          <p:cNvPr id="24" name="Rectangle 23"/>
-          <p:cNvSpPr/>
-          <p:nvPr/>
-        </p:nvSpPr>
-        <p:spPr>
-          <a:xfrm>
-            <a:off x="6636474" y="7573705"/>
-            <a:ext cx="4648294" cy="646331"/>
-          </a:xfrm>
-          <a:prstGeom prst="rect">
-            <a:avLst/>
-          </a:prstGeom>
-        </p:spPr>
-        <p:txBody>
-          <a:bodyPr wrap="square">
-            <a:spAutoFit/>
-          </a:bodyPr>
-          <a:lstStyle/>
-          <a:p>
-            <a:pPr algn="ctr"/>
-            <a:r>
-              <a:rPr lang="en-US" sz="1800" i="1" dirty="0" err="1"/>
-              <a:t>Burkholderia</a:t>
-            </a:r>
-            <a:r>
-              <a:rPr lang="en-US" sz="1800" i="1" dirty="0"/>
-              <a:t> </a:t>
-            </a:r>
-            <a:r>
-              <a:rPr lang="en-US" sz="1800" i="1" dirty="0" err="1"/>
-              <a:t>pseudomallei</a:t>
-            </a:r>
-            <a:r>
-              <a:rPr lang="en-US" sz="1800" i="1" dirty="0"/>
-              <a:t> </a:t>
-            </a:r>
-            <a:r>
-              <a:rPr lang="en-US" sz="1800" i="1" dirty="0" smtClean="0"/>
-              <a:t>K96243</a:t>
-            </a:r>
-          </a:p>
-          <a:p>
-            <a:pPr algn="ctr"/>
-            <a:r>
-              <a:rPr lang="is-IS" sz="1800" dirty="0" smtClean="0"/>
-              <a:t>NC_006350.1:2082167-2082000(-)</a:t>
-            </a:r>
-            <a:endParaRPr lang="en-US" sz="1800" dirty="0"/>
-          </a:p>
-        </p:txBody>
-      </p:sp>
       <p:pic>
         <p:nvPicPr>
-          <p:cNvPr id="2" name="Picture 1"/>
+          <p:cNvPr id="6" name="Picture 5"/>
           <p:cNvPicPr>
             <a:picLocks noChangeAspect="1"/>
           </p:cNvPicPr>
@@ -3420,8 +3419,8 @@
         </p:blipFill>
         <p:spPr>
           <a:xfrm>
-            <a:off x="60154" y="0"/>
-            <a:ext cx="4628571" cy="8229600"/>
+            <a:off x="2624410" y="0"/>
+            <a:ext cx="9727660" cy="8229600"/>
           </a:xfrm>
           <a:prstGeom prst="rect">
             <a:avLst/>
@@ -3430,7 +3429,7 @@
       </p:pic>
       <p:pic>
         <p:nvPicPr>
-          <p:cNvPr id="5" name="Picture 4"/>
+          <p:cNvPr id="7" name="Picture 6"/>
           <p:cNvPicPr>
             <a:picLocks noChangeAspect="1"/>
           </p:cNvPicPr>
@@ -3450,8 +3449,8 @@
         </p:blipFill>
         <p:spPr>
           <a:xfrm>
-            <a:off x="11848391" y="0"/>
-            <a:ext cx="3741949" cy="7573705"/>
+            <a:off x="12061241" y="0"/>
+            <a:ext cx="3501810" cy="7710985"/>
           </a:xfrm>
           <a:prstGeom prst="rect">
             <a:avLst/>

</xml_diff>